<commit_message>
corrections to maxflow chapter
</commit_message>
<xml_diff>
--- a/graphAlgorithms/maxflow/figs.pptx
+++ b/graphAlgorithms/maxflow/figs.pptx
@@ -6,10 +6,10 @@
     <p:sldMasterId id="2147483651" r:id="rId2"/>
   </p:sldMasterIdLst>
   <p:notesMasterIdLst>
-    <p:notesMasterId r:id="rId13"/>
+    <p:notesMasterId r:id="rId14"/>
   </p:notesMasterIdLst>
   <p:handoutMasterIdLst>
-    <p:handoutMasterId r:id="rId14"/>
+    <p:handoutMasterId r:id="rId15"/>
   </p:handoutMasterIdLst>
   <p:sldIdLst>
     <p:sldId id="801" r:id="rId3"/>
@@ -22,6 +22,7 @@
     <p:sldId id="808" r:id="rId10"/>
     <p:sldId id="809" r:id="rId11"/>
     <p:sldId id="810" r:id="rId12"/>
+    <p:sldId id="811" r:id="rId13"/>
   </p:sldIdLst>
   <p:sldSz cx="9144000" cy="6858000" type="letter"/>
   <p:notesSz cx="6858000" cy="8686800"/>
@@ -22306,6 +22307,3894 @@
 </p:sld>
 </file>
 
+<file path=ppt/slides/slide11.xml><?xml version="1.0" encoding="utf-8"?>
+<p:sld xmlns:a="http://schemas.openxmlformats.org/drawingml/2006/main" xmlns:r="http://schemas.openxmlformats.org/officeDocument/2006/relationships" xmlns:p="http://schemas.openxmlformats.org/presentationml/2006/main">
+  <p:cSld>
+    <p:spTree>
+      <p:nvGrpSpPr>
+        <p:cNvPr id="1" name=""/>
+        <p:cNvGrpSpPr/>
+        <p:nvPr/>
+      </p:nvGrpSpPr>
+      <p:grpSpPr>
+        <a:xfrm>
+          <a:off x="0" y="0"/>
+          <a:ext cx="0" cy="0"/>
+          <a:chOff x="0" y="0"/>
+          <a:chExt cx="0" cy="0"/>
+        </a:xfrm>
+      </p:grpSpPr>
+      <p:sp>
+        <p:nvSpPr>
+          <p:cNvPr id="2" name="Title 1">
+            <a:extLst>
+              <a:ext uri="{FF2B5EF4-FFF2-40B4-BE49-F238E27FC236}">
+                <a16:creationId xmlns:a16="http://schemas.microsoft.com/office/drawing/2014/main" id="{3E428BBA-8906-CA39-C134-0FD75EFDC1D2}"/>
+              </a:ext>
+            </a:extLst>
+          </p:cNvPr>
+          <p:cNvSpPr>
+            <a:spLocks noGrp="1"/>
+          </p:cNvSpPr>
+          <p:nvPr>
+            <p:ph type="title"/>
+          </p:nvPr>
+        </p:nvSpPr>
+        <p:spPr/>
+        <p:txBody>
+          <a:bodyPr/>
+          <a:lstStyle/>
+          <a:p>
+            <a:r>
+              <a:rPr lang="en-US" dirty="0"/>
+              <a:t>floors</a:t>
+            </a:r>
+          </a:p>
+        </p:txBody>
+      </p:sp>
+      <p:grpSp>
+        <p:nvGrpSpPr>
+          <p:cNvPr id="134" name="Group 133">
+            <a:extLst>
+              <a:ext uri="{FF2B5EF4-FFF2-40B4-BE49-F238E27FC236}">
+                <a16:creationId xmlns:a16="http://schemas.microsoft.com/office/drawing/2014/main" id="{DF8EE0B2-293A-94CA-3D51-C93DAF6EFB47}"/>
+              </a:ext>
+            </a:extLst>
+          </p:cNvPr>
+          <p:cNvGrpSpPr/>
+          <p:nvPr/>
+        </p:nvGrpSpPr>
+        <p:grpSpPr>
+          <a:xfrm>
+            <a:off x="425004" y="1806034"/>
+            <a:ext cx="7967564" cy="2918832"/>
+            <a:chOff x="425004" y="1806034"/>
+            <a:chExt cx="7967564" cy="2918832"/>
+          </a:xfrm>
+        </p:grpSpPr>
+        <p:sp>
+          <p:nvSpPr>
+            <p:cNvPr id="5" name="Line 19">
+              <a:extLst>
+                <a:ext uri="{FF2B5EF4-FFF2-40B4-BE49-F238E27FC236}">
+                  <a16:creationId xmlns:a16="http://schemas.microsoft.com/office/drawing/2014/main" id="{9D837D8E-F39B-F891-7C69-6349B32A18BA}"/>
+                </a:ext>
+              </a:extLst>
+            </p:cNvPr>
+            <p:cNvSpPr>
+              <a:spLocks noChangeShapeType="1"/>
+            </p:cNvSpPr>
+            <p:nvPr/>
+          </p:nvSpPr>
+          <p:spPr bwMode="auto">
+            <a:xfrm>
+              <a:off x="2482521" y="3559341"/>
+              <a:ext cx="468180" cy="621043"/>
+            </a:xfrm>
+            <a:prstGeom prst="line">
+              <a:avLst/>
+            </a:prstGeom>
+            <a:noFill/>
+            <a:ln w="12700" cap="flat" cmpd="sng" algn="ctr">
+              <a:solidFill>
+                <a:schemeClr val="tx1"/>
+              </a:solidFill>
+              <a:prstDash val="solid"/>
+              <a:round/>
+              <a:headEnd type="none" w="med" len="med"/>
+              <a:tailEnd type="triangle" w="med" len="med"/>
+            </a:ln>
+            <a:effectLst/>
+          </p:spPr>
+          <p:txBody>
+            <a:bodyPr/>
+            <a:lstStyle/>
+            <a:p>
+              <a:endParaRPr lang="en-US" sz="1800">
+                <a:latin typeface="+mn-lt"/>
+              </a:endParaRPr>
+            </a:p>
+          </p:txBody>
+        </p:sp>
+        <p:sp>
+          <p:nvSpPr>
+            <p:cNvPr id="6" name="Text Box 34">
+              <a:extLst>
+                <a:ext uri="{FF2B5EF4-FFF2-40B4-BE49-F238E27FC236}">
+                  <a16:creationId xmlns:a16="http://schemas.microsoft.com/office/drawing/2014/main" id="{49CCE34B-CF79-81DC-BD68-99BB86626AF2}"/>
+                </a:ext>
+              </a:extLst>
+            </p:cNvPr>
+            <p:cNvSpPr txBox="1">
+              <a:spLocks noChangeArrowheads="1"/>
+            </p:cNvSpPr>
+            <p:nvPr/>
+          </p:nvSpPr>
+          <p:spPr bwMode="auto">
+            <a:xfrm>
+              <a:off x="2517898" y="3722467"/>
+              <a:ext cx="361920" cy="215444"/>
+            </a:xfrm>
+            <a:prstGeom prst="rect">
+              <a:avLst/>
+            </a:prstGeom>
+            <a:solidFill>
+              <a:schemeClr val="bg1"/>
+            </a:solidFill>
+            <a:ln w="9525">
+              <a:noFill/>
+              <a:miter lim="800000"/>
+              <a:headEnd/>
+              <a:tailEnd/>
+            </a:ln>
+            <a:effectLst/>
+          </p:spPr>
+          <p:txBody>
+            <a:bodyPr wrap="square" lIns="0" tIns="0" rIns="0" bIns="0">
+              <a:spAutoFit/>
+            </a:bodyPr>
+            <a:lstStyle/>
+            <a:p>
+              <a:pPr algn="ctr">
+                <a:spcBef>
+                  <a:spcPct val="50000"/>
+                </a:spcBef>
+              </a:pPr>
+              <a:r>
+                <a:rPr lang="en-US" sz="1400" dirty="0">
+                  <a:latin typeface="+mn-lt"/>
+                </a:rPr>
+                <a:t>1-2</a:t>
+              </a:r>
+            </a:p>
+          </p:txBody>
+        </p:sp>
+        <p:sp>
+          <p:nvSpPr>
+            <p:cNvPr id="7" name="Oval 6">
+              <a:extLst>
+                <a:ext uri="{FF2B5EF4-FFF2-40B4-BE49-F238E27FC236}">
+                  <a16:creationId xmlns:a16="http://schemas.microsoft.com/office/drawing/2014/main" id="{93944350-D0FC-4323-89EE-AAB56E54872B}"/>
+                </a:ext>
+              </a:extLst>
+            </p:cNvPr>
+            <p:cNvSpPr>
+              <a:spLocks noChangeArrowheads="1"/>
+            </p:cNvSpPr>
+            <p:nvPr/>
+          </p:nvSpPr>
+          <p:spPr bwMode="auto">
+            <a:xfrm>
+              <a:off x="982835" y="3327704"/>
+              <a:ext cx="263849" cy="272858"/>
+            </a:xfrm>
+            <a:prstGeom prst="ellipse">
+              <a:avLst/>
+            </a:prstGeom>
+            <a:solidFill>
+              <a:srgbClr val="CCFFFF"/>
+            </a:solidFill>
+            <a:ln w="9525">
+              <a:solidFill>
+                <a:schemeClr val="tx1"/>
+              </a:solidFill>
+              <a:round/>
+              <a:headEnd/>
+              <a:tailEnd/>
+            </a:ln>
+            <a:effectLst/>
+          </p:spPr>
+          <p:txBody>
+            <a:bodyPr wrap="none" anchor="ctr"/>
+            <a:lstStyle/>
+            <a:p>
+              <a:pPr algn="ctr"/>
+              <a:r>
+                <a:rPr lang="en-US" sz="1400" i="1">
+                  <a:latin typeface="+mn-lt"/>
+                </a:rPr>
+                <a:t>s</a:t>
+              </a:r>
+            </a:p>
+          </p:txBody>
+        </p:sp>
+        <p:sp>
+          <p:nvSpPr>
+            <p:cNvPr id="8" name="Oval 7">
+              <a:extLst>
+                <a:ext uri="{FF2B5EF4-FFF2-40B4-BE49-F238E27FC236}">
+                  <a16:creationId xmlns:a16="http://schemas.microsoft.com/office/drawing/2014/main" id="{14B1CE06-09A0-4AFA-3FB8-7EA8595C65B2}"/>
+                </a:ext>
+              </a:extLst>
+            </p:cNvPr>
+            <p:cNvSpPr>
+              <a:spLocks noChangeArrowheads="1"/>
+            </p:cNvSpPr>
+            <p:nvPr/>
+          </p:nvSpPr>
+          <p:spPr bwMode="auto">
+            <a:xfrm>
+              <a:off x="2242965" y="3316502"/>
+              <a:ext cx="263849" cy="272858"/>
+            </a:xfrm>
+            <a:prstGeom prst="ellipse">
+              <a:avLst/>
+            </a:prstGeom>
+            <a:solidFill>
+              <a:srgbClr val="CCFFFF"/>
+            </a:solidFill>
+            <a:ln w="9525">
+              <a:solidFill>
+                <a:schemeClr val="tx1"/>
+              </a:solidFill>
+              <a:round/>
+              <a:headEnd/>
+              <a:tailEnd/>
+            </a:ln>
+            <a:effectLst/>
+          </p:spPr>
+          <p:txBody>
+            <a:bodyPr wrap="none" anchor="ctr"/>
+            <a:lstStyle/>
+            <a:p>
+              <a:pPr algn="ctr"/>
+              <a:r>
+                <a:rPr lang="en-US" sz="1400" i="1">
+                  <a:latin typeface="+mn-lt"/>
+                </a:rPr>
+                <a:t>c</a:t>
+              </a:r>
+            </a:p>
+          </p:txBody>
+        </p:sp>
+        <p:sp>
+          <p:nvSpPr>
+            <p:cNvPr id="9" name="Oval 8">
+              <a:extLst>
+                <a:ext uri="{FF2B5EF4-FFF2-40B4-BE49-F238E27FC236}">
+                  <a16:creationId xmlns:a16="http://schemas.microsoft.com/office/drawing/2014/main" id="{70C8E584-E015-09AC-6C65-DFF39A90C5A4}"/>
+                </a:ext>
+              </a:extLst>
+            </p:cNvPr>
+            <p:cNvSpPr>
+              <a:spLocks noChangeArrowheads="1"/>
+            </p:cNvSpPr>
+            <p:nvPr/>
+          </p:nvSpPr>
+          <p:spPr bwMode="auto">
+            <a:xfrm>
+              <a:off x="1774379" y="4146278"/>
+              <a:ext cx="263849" cy="272858"/>
+            </a:xfrm>
+            <a:prstGeom prst="ellipse">
+              <a:avLst/>
+            </a:prstGeom>
+            <a:solidFill>
+              <a:srgbClr val="CCFFFF"/>
+            </a:solidFill>
+            <a:ln w="9525">
+              <a:solidFill>
+                <a:schemeClr val="tx1"/>
+              </a:solidFill>
+              <a:round/>
+              <a:headEnd/>
+              <a:tailEnd/>
+            </a:ln>
+            <a:effectLst/>
+          </p:spPr>
+          <p:txBody>
+            <a:bodyPr wrap="none" anchor="ctr"/>
+            <a:lstStyle/>
+            <a:p>
+              <a:pPr algn="ctr"/>
+              <a:r>
+                <a:rPr lang="en-US" sz="1400" i="1">
+                  <a:latin typeface="+mn-lt"/>
+                </a:rPr>
+                <a:t>d</a:t>
+              </a:r>
+            </a:p>
+          </p:txBody>
+        </p:sp>
+        <p:sp>
+          <p:nvSpPr>
+            <p:cNvPr id="10" name="Oval 9">
+              <a:extLst>
+                <a:ext uri="{FF2B5EF4-FFF2-40B4-BE49-F238E27FC236}">
+                  <a16:creationId xmlns:a16="http://schemas.microsoft.com/office/drawing/2014/main" id="{FD9AF0FA-03CE-5DCB-9CD1-EA3E302AD0A8}"/>
+                </a:ext>
+              </a:extLst>
+            </p:cNvPr>
+            <p:cNvSpPr>
+              <a:spLocks noChangeArrowheads="1"/>
+            </p:cNvSpPr>
+            <p:nvPr/>
+          </p:nvSpPr>
+          <p:spPr bwMode="auto">
+            <a:xfrm>
+              <a:off x="2917718" y="4146278"/>
+              <a:ext cx="263849" cy="272858"/>
+            </a:xfrm>
+            <a:prstGeom prst="ellipse">
+              <a:avLst/>
+            </a:prstGeom>
+            <a:solidFill>
+              <a:srgbClr val="CCFFFF"/>
+            </a:solidFill>
+            <a:ln w="9525">
+              <a:solidFill>
+                <a:schemeClr val="tx1"/>
+              </a:solidFill>
+              <a:round/>
+              <a:headEnd/>
+              <a:tailEnd/>
+            </a:ln>
+            <a:effectLst/>
+          </p:spPr>
+          <p:txBody>
+            <a:bodyPr wrap="none" anchor="ctr"/>
+            <a:lstStyle/>
+            <a:p>
+              <a:pPr algn="ctr"/>
+              <a:r>
+                <a:rPr lang="en-US" sz="1400" i="1">
+                  <a:latin typeface="+mn-lt"/>
+                </a:rPr>
+                <a:t>g</a:t>
+              </a:r>
+            </a:p>
+          </p:txBody>
+        </p:sp>
+        <p:sp>
+          <p:nvSpPr>
+            <p:cNvPr id="14" name="Oval 13">
+              <a:extLst>
+                <a:ext uri="{FF2B5EF4-FFF2-40B4-BE49-F238E27FC236}">
+                  <a16:creationId xmlns:a16="http://schemas.microsoft.com/office/drawing/2014/main" id="{A55E943F-D05D-149B-82A3-3D3A7C76C42B}"/>
+                </a:ext>
+              </a:extLst>
+            </p:cNvPr>
+            <p:cNvSpPr>
+              <a:spLocks noChangeArrowheads="1"/>
+            </p:cNvSpPr>
+            <p:nvPr/>
+          </p:nvSpPr>
+          <p:spPr bwMode="auto">
+            <a:xfrm>
+              <a:off x="2917718" y="2509130"/>
+              <a:ext cx="263849" cy="272858"/>
+            </a:xfrm>
+            <a:prstGeom prst="ellipse">
+              <a:avLst/>
+            </a:prstGeom>
+            <a:solidFill>
+              <a:srgbClr val="CCFFFF"/>
+            </a:solidFill>
+            <a:ln w="9525">
+              <a:solidFill>
+                <a:schemeClr val="tx1"/>
+              </a:solidFill>
+              <a:round/>
+              <a:headEnd/>
+              <a:tailEnd/>
+            </a:ln>
+            <a:effectLst/>
+          </p:spPr>
+          <p:txBody>
+            <a:bodyPr wrap="none" anchor="ctr"/>
+            <a:lstStyle/>
+            <a:p>
+              <a:pPr algn="ctr"/>
+              <a:r>
+                <a:rPr lang="en-US" sz="1400" i="1">
+                  <a:latin typeface="+mn-lt"/>
+                </a:rPr>
+                <a:t>e</a:t>
+              </a:r>
+            </a:p>
+          </p:txBody>
+        </p:sp>
+        <p:sp>
+          <p:nvSpPr>
+            <p:cNvPr id="15" name="Oval 14">
+              <a:extLst>
+                <a:ext uri="{FF2B5EF4-FFF2-40B4-BE49-F238E27FC236}">
+                  <a16:creationId xmlns:a16="http://schemas.microsoft.com/office/drawing/2014/main" id="{CFADBA3D-D4C7-1088-E86B-0EC1F11ED643}"/>
+                </a:ext>
+              </a:extLst>
+            </p:cNvPr>
+            <p:cNvSpPr>
+              <a:spLocks noChangeArrowheads="1"/>
+            </p:cNvSpPr>
+            <p:nvPr/>
+          </p:nvSpPr>
+          <p:spPr bwMode="auto">
+            <a:xfrm>
+              <a:off x="1774379" y="2509130"/>
+              <a:ext cx="263849" cy="272858"/>
+            </a:xfrm>
+            <a:prstGeom prst="ellipse">
+              <a:avLst/>
+            </a:prstGeom>
+            <a:solidFill>
+              <a:srgbClr val="CCFFFF"/>
+            </a:solidFill>
+            <a:ln w="9525">
+              <a:solidFill>
+                <a:schemeClr val="tx1"/>
+              </a:solidFill>
+              <a:round/>
+              <a:headEnd/>
+              <a:tailEnd/>
+            </a:ln>
+            <a:effectLst/>
+          </p:spPr>
+          <p:txBody>
+            <a:bodyPr wrap="none" anchor="ctr"/>
+            <a:lstStyle/>
+            <a:p>
+              <a:pPr algn="ctr"/>
+              <a:r>
+                <a:rPr lang="en-US" sz="1400" i="1">
+                  <a:latin typeface="+mn-lt"/>
+                </a:rPr>
+                <a:t>b</a:t>
+              </a:r>
+            </a:p>
+          </p:txBody>
+        </p:sp>
+        <p:sp>
+          <p:nvSpPr>
+            <p:cNvPr id="16" name="Oval 15">
+              <a:extLst>
+                <a:ext uri="{FF2B5EF4-FFF2-40B4-BE49-F238E27FC236}">
+                  <a16:creationId xmlns:a16="http://schemas.microsoft.com/office/drawing/2014/main" id="{D7ED1207-0663-9D4C-D968-F8049E446D80}"/>
+                </a:ext>
+              </a:extLst>
+            </p:cNvPr>
+            <p:cNvSpPr>
+              <a:spLocks noChangeArrowheads="1"/>
+            </p:cNvSpPr>
+            <p:nvPr/>
+          </p:nvSpPr>
+          <p:spPr bwMode="auto">
+            <a:xfrm>
+              <a:off x="3579140" y="3294106"/>
+              <a:ext cx="263849" cy="272858"/>
+            </a:xfrm>
+            <a:prstGeom prst="ellipse">
+              <a:avLst/>
+            </a:prstGeom>
+            <a:solidFill>
+              <a:srgbClr val="CCFFFF"/>
+            </a:solidFill>
+            <a:ln w="9525">
+              <a:solidFill>
+                <a:schemeClr val="tx1"/>
+              </a:solidFill>
+              <a:round/>
+              <a:headEnd/>
+              <a:tailEnd/>
+            </a:ln>
+            <a:effectLst/>
+          </p:spPr>
+          <p:txBody>
+            <a:bodyPr wrap="none" anchor="ctr"/>
+            <a:lstStyle/>
+            <a:p>
+              <a:pPr algn="ctr"/>
+              <a:r>
+                <a:rPr lang="en-US" sz="1400" i="1" dirty="0">
+                  <a:latin typeface="+mn-lt"/>
+                </a:rPr>
+                <a:t>t</a:t>
+              </a:r>
+            </a:p>
+          </p:txBody>
+        </p:sp>
+        <p:sp>
+          <p:nvSpPr>
+            <p:cNvPr id="17" name="Line 15">
+              <a:extLst>
+                <a:ext uri="{FF2B5EF4-FFF2-40B4-BE49-F238E27FC236}">
+                  <a16:creationId xmlns:a16="http://schemas.microsoft.com/office/drawing/2014/main" id="{EBDC3465-9FF2-CFF8-9F8B-BC0CA4023BB2}"/>
+                </a:ext>
+              </a:extLst>
+            </p:cNvPr>
+            <p:cNvSpPr>
+              <a:spLocks noChangeShapeType="1"/>
+            </p:cNvSpPr>
+            <p:nvPr/>
+          </p:nvSpPr>
+          <p:spPr bwMode="auto">
+            <a:xfrm flipV="1">
+              <a:off x="1213702" y="2747881"/>
+              <a:ext cx="593657" cy="613930"/>
+            </a:xfrm>
+            <a:prstGeom prst="line">
+              <a:avLst/>
+            </a:prstGeom>
+            <a:noFill/>
+            <a:ln w="9525">
+              <a:solidFill>
+                <a:schemeClr val="tx1"/>
+              </a:solidFill>
+              <a:round/>
+              <a:headEnd/>
+              <a:tailEnd type="triangle" w="med" len="med"/>
+            </a:ln>
+            <a:effectLst/>
+          </p:spPr>
+          <p:txBody>
+            <a:bodyPr/>
+            <a:lstStyle/>
+            <a:p>
+              <a:endParaRPr lang="en-US" sz="1800">
+                <a:latin typeface="+mn-lt"/>
+              </a:endParaRPr>
+            </a:p>
+          </p:txBody>
+        </p:sp>
+        <p:sp>
+          <p:nvSpPr>
+            <p:cNvPr id="18" name="Line 16">
+              <a:extLst>
+                <a:ext uri="{FF2B5EF4-FFF2-40B4-BE49-F238E27FC236}">
+                  <a16:creationId xmlns:a16="http://schemas.microsoft.com/office/drawing/2014/main" id="{79B343FE-F1B9-61C7-1CD9-0CFB88193CFE}"/>
+                </a:ext>
+              </a:extLst>
+            </p:cNvPr>
+            <p:cNvSpPr>
+              <a:spLocks noChangeShapeType="1"/>
+            </p:cNvSpPr>
+            <p:nvPr/>
+          </p:nvSpPr>
+          <p:spPr bwMode="auto">
+            <a:xfrm flipV="1">
+              <a:off x="1246684" y="3461055"/>
+              <a:ext cx="996281" cy="14446"/>
+            </a:xfrm>
+            <a:prstGeom prst="line">
+              <a:avLst/>
+            </a:prstGeom>
+            <a:noFill/>
+            <a:ln w="9525">
+              <a:solidFill>
+                <a:schemeClr val="tx1"/>
+              </a:solidFill>
+              <a:round/>
+              <a:headEnd/>
+              <a:tailEnd type="triangle" w="med" len="med"/>
+            </a:ln>
+            <a:effectLst/>
+          </p:spPr>
+          <p:txBody>
+            <a:bodyPr/>
+            <a:lstStyle/>
+            <a:p>
+              <a:endParaRPr lang="en-US" sz="1800">
+                <a:latin typeface="+mn-lt"/>
+              </a:endParaRPr>
+            </a:p>
+          </p:txBody>
+        </p:sp>
+        <p:sp>
+          <p:nvSpPr>
+            <p:cNvPr id="19" name="Line 17">
+              <a:extLst>
+                <a:ext uri="{FF2B5EF4-FFF2-40B4-BE49-F238E27FC236}">
+                  <a16:creationId xmlns:a16="http://schemas.microsoft.com/office/drawing/2014/main" id="{BA7BD425-DEA5-82E2-3584-29D33C0B7319}"/>
+                </a:ext>
+              </a:extLst>
+            </p:cNvPr>
+            <p:cNvSpPr>
+              <a:spLocks noChangeShapeType="1"/>
+            </p:cNvSpPr>
+            <p:nvPr/>
+          </p:nvSpPr>
+          <p:spPr bwMode="auto">
+            <a:xfrm>
+              <a:off x="1213702" y="3577824"/>
+              <a:ext cx="582663" cy="613930"/>
+            </a:xfrm>
+            <a:prstGeom prst="line">
+              <a:avLst/>
+            </a:prstGeom>
+            <a:noFill/>
+            <a:ln w="9525">
+              <a:solidFill>
+                <a:schemeClr val="tx1"/>
+              </a:solidFill>
+              <a:round/>
+              <a:headEnd/>
+              <a:tailEnd type="triangle" w="med" len="med"/>
+            </a:ln>
+            <a:effectLst/>
+          </p:spPr>
+          <p:txBody>
+            <a:bodyPr/>
+            <a:lstStyle/>
+            <a:p>
+              <a:endParaRPr lang="en-US" sz="1800">
+                <a:latin typeface="+mn-lt"/>
+              </a:endParaRPr>
+            </a:p>
+          </p:txBody>
+        </p:sp>
+        <p:sp>
+          <p:nvSpPr>
+            <p:cNvPr id="20" name="Line 18">
+              <a:extLst>
+                <a:ext uri="{FF2B5EF4-FFF2-40B4-BE49-F238E27FC236}">
+                  <a16:creationId xmlns:a16="http://schemas.microsoft.com/office/drawing/2014/main" id="{D04992AA-19CD-C7A9-3646-970E5993B697}"/>
+                </a:ext>
+              </a:extLst>
+            </p:cNvPr>
+            <p:cNvSpPr>
+              <a:spLocks noChangeShapeType="1"/>
+            </p:cNvSpPr>
+            <p:nvPr/>
+          </p:nvSpPr>
+          <p:spPr bwMode="auto">
+            <a:xfrm>
+              <a:off x="2038227" y="4294074"/>
+              <a:ext cx="879494" cy="0"/>
+            </a:xfrm>
+            <a:prstGeom prst="line">
+              <a:avLst/>
+            </a:prstGeom>
+            <a:noFill/>
+            <a:ln w="12700" cap="flat" cmpd="sng" algn="ctr">
+              <a:solidFill>
+                <a:schemeClr val="tx1"/>
+              </a:solidFill>
+              <a:prstDash val="solid"/>
+              <a:round/>
+              <a:headEnd type="none" w="med" len="med"/>
+              <a:tailEnd type="triangle" w="med" len="med"/>
+            </a:ln>
+            <a:effectLst/>
+          </p:spPr>
+          <p:txBody>
+            <a:bodyPr/>
+            <a:lstStyle/>
+            <a:p>
+              <a:endParaRPr lang="en-US" sz="1800">
+                <a:latin typeface="+mn-lt"/>
+              </a:endParaRPr>
+            </a:p>
+          </p:txBody>
+        </p:sp>
+        <p:sp>
+          <p:nvSpPr>
+            <p:cNvPr id="22" name="Line 21">
+              <a:extLst>
+                <a:ext uri="{FF2B5EF4-FFF2-40B4-BE49-F238E27FC236}">
+                  <a16:creationId xmlns:a16="http://schemas.microsoft.com/office/drawing/2014/main" id="{9B9659F3-80E8-B129-645D-183698530EC5}"/>
+                </a:ext>
+              </a:extLst>
+            </p:cNvPr>
+            <p:cNvSpPr>
+              <a:spLocks noChangeShapeType="1"/>
+            </p:cNvSpPr>
+            <p:nvPr/>
+          </p:nvSpPr>
+          <p:spPr bwMode="auto">
+            <a:xfrm flipV="1">
+              <a:off x="2467647" y="2747881"/>
+              <a:ext cx="483051" cy="601525"/>
+            </a:xfrm>
+            <a:prstGeom prst="line">
+              <a:avLst/>
+            </a:prstGeom>
+            <a:noFill/>
+            <a:ln w="12700" cap="flat" cmpd="sng" algn="ctr">
+              <a:solidFill>
+                <a:schemeClr val="tx1"/>
+              </a:solidFill>
+              <a:prstDash val="solid"/>
+              <a:round/>
+              <a:headEnd type="none" w="med" len="med"/>
+              <a:tailEnd type="triangle" w="med" len="med"/>
+            </a:ln>
+            <a:effectLst/>
+          </p:spPr>
+          <p:txBody>
+            <a:bodyPr/>
+            <a:lstStyle/>
+            <a:p>
+              <a:endParaRPr lang="en-US" sz="1800">
+                <a:latin typeface="+mn-lt"/>
+              </a:endParaRPr>
+            </a:p>
+          </p:txBody>
+        </p:sp>
+        <p:sp>
+          <p:nvSpPr>
+            <p:cNvPr id="23" name="Line 22">
+              <a:extLst>
+                <a:ext uri="{FF2B5EF4-FFF2-40B4-BE49-F238E27FC236}">
+                  <a16:creationId xmlns:a16="http://schemas.microsoft.com/office/drawing/2014/main" id="{A6AA7038-7A04-399C-56CE-7025CD162222}"/>
+                </a:ext>
+              </a:extLst>
+            </p:cNvPr>
+            <p:cNvSpPr>
+              <a:spLocks noChangeShapeType="1"/>
+            </p:cNvSpPr>
+            <p:nvPr/>
+          </p:nvSpPr>
+          <p:spPr bwMode="auto">
+            <a:xfrm>
+              <a:off x="2038227" y="2645561"/>
+              <a:ext cx="879494" cy="0"/>
+            </a:xfrm>
+            <a:prstGeom prst="line">
+              <a:avLst/>
+            </a:prstGeom>
+            <a:noFill/>
+            <a:ln w="9525">
+              <a:solidFill>
+                <a:schemeClr val="tx1"/>
+              </a:solidFill>
+              <a:round/>
+              <a:headEnd/>
+              <a:tailEnd type="triangle" w="med" len="med"/>
+            </a:ln>
+            <a:effectLst/>
+          </p:spPr>
+          <p:txBody>
+            <a:bodyPr/>
+            <a:lstStyle/>
+            <a:p>
+              <a:endParaRPr lang="en-US" sz="1800">
+                <a:latin typeface="+mn-lt"/>
+              </a:endParaRPr>
+            </a:p>
+          </p:txBody>
+        </p:sp>
+        <p:sp>
+          <p:nvSpPr>
+            <p:cNvPr id="24" name="Line 23">
+              <a:extLst>
+                <a:ext uri="{FF2B5EF4-FFF2-40B4-BE49-F238E27FC236}">
+                  <a16:creationId xmlns:a16="http://schemas.microsoft.com/office/drawing/2014/main" id="{15933690-CA6F-837F-6274-6AAAA62FF706}"/>
+                </a:ext>
+              </a:extLst>
+            </p:cNvPr>
+            <p:cNvSpPr>
+              <a:spLocks noChangeShapeType="1"/>
+            </p:cNvSpPr>
+            <p:nvPr/>
+          </p:nvSpPr>
+          <p:spPr bwMode="auto">
+            <a:xfrm>
+              <a:off x="3144443" y="2759252"/>
+              <a:ext cx="472321" cy="567454"/>
+            </a:xfrm>
+            <a:prstGeom prst="line">
+              <a:avLst/>
+            </a:prstGeom>
+            <a:noFill/>
+            <a:ln w="12700" cap="flat" cmpd="sng" algn="ctr">
+              <a:solidFill>
+                <a:schemeClr val="tx1"/>
+              </a:solidFill>
+              <a:prstDash val="solid"/>
+              <a:round/>
+              <a:headEnd type="none" w="med" len="med"/>
+              <a:tailEnd type="triangle" w="med" len="med"/>
+            </a:ln>
+            <a:effectLst/>
+          </p:spPr>
+          <p:txBody>
+            <a:bodyPr/>
+            <a:lstStyle/>
+            <a:p>
+              <a:endParaRPr lang="en-US" sz="1800">
+                <a:latin typeface="+mn-lt"/>
+              </a:endParaRPr>
+            </a:p>
+          </p:txBody>
+        </p:sp>
+        <p:sp>
+          <p:nvSpPr>
+            <p:cNvPr id="31" name="Line 30">
+              <a:extLst>
+                <a:ext uri="{FF2B5EF4-FFF2-40B4-BE49-F238E27FC236}">
+                  <a16:creationId xmlns:a16="http://schemas.microsoft.com/office/drawing/2014/main" id="{8AED964B-2636-AB1A-259C-1B9162302AFF}"/>
+                </a:ext>
+              </a:extLst>
+            </p:cNvPr>
+            <p:cNvSpPr>
+              <a:spLocks noChangeShapeType="1"/>
+            </p:cNvSpPr>
+            <p:nvPr/>
+          </p:nvSpPr>
+          <p:spPr bwMode="auto">
+            <a:xfrm flipV="1">
+              <a:off x="3112691" y="3539932"/>
+              <a:ext cx="525249" cy="639456"/>
+            </a:xfrm>
+            <a:prstGeom prst="line">
+              <a:avLst/>
+            </a:prstGeom>
+            <a:noFill/>
+            <a:ln w="12700" cap="flat" cmpd="sng" algn="ctr">
+              <a:solidFill>
+                <a:schemeClr val="tx1"/>
+              </a:solidFill>
+              <a:prstDash val="solid"/>
+              <a:round/>
+              <a:headEnd type="none" w="med" len="med"/>
+              <a:tailEnd type="triangle" w="med" len="med"/>
+            </a:ln>
+            <a:effectLst/>
+          </p:spPr>
+          <p:txBody>
+            <a:bodyPr/>
+            <a:lstStyle/>
+            <a:p>
+              <a:endParaRPr lang="en-US" sz="1800">
+                <a:latin typeface="+mn-lt"/>
+              </a:endParaRPr>
+            </a:p>
+          </p:txBody>
+        </p:sp>
+        <p:sp>
+          <p:nvSpPr>
+            <p:cNvPr id="32" name="Line 31">
+              <a:extLst>
+                <a:ext uri="{FF2B5EF4-FFF2-40B4-BE49-F238E27FC236}">
+                  <a16:creationId xmlns:a16="http://schemas.microsoft.com/office/drawing/2014/main" id="{4F2D5FA8-854B-C764-9F10-1C7436BB5133}"/>
+                </a:ext>
+              </a:extLst>
+            </p:cNvPr>
+            <p:cNvSpPr>
+              <a:spLocks noChangeShapeType="1"/>
+            </p:cNvSpPr>
+            <p:nvPr/>
+          </p:nvSpPr>
+          <p:spPr bwMode="auto">
+            <a:xfrm>
+              <a:off x="1939282" y="2770618"/>
+              <a:ext cx="334525" cy="578773"/>
+            </a:xfrm>
+            <a:prstGeom prst="line">
+              <a:avLst/>
+            </a:prstGeom>
+            <a:noFill/>
+            <a:ln w="9525">
+              <a:solidFill>
+                <a:schemeClr val="tx1"/>
+              </a:solidFill>
+              <a:round/>
+              <a:headEnd/>
+              <a:tailEnd type="triangle" w="med" len="med"/>
+            </a:ln>
+            <a:effectLst/>
+          </p:spPr>
+          <p:txBody>
+            <a:bodyPr/>
+            <a:lstStyle/>
+            <a:p>
+              <a:endParaRPr lang="en-US" sz="1800">
+                <a:latin typeface="+mn-lt"/>
+              </a:endParaRPr>
+            </a:p>
+          </p:txBody>
+        </p:sp>
+        <p:sp>
+          <p:nvSpPr>
+            <p:cNvPr id="33" name="Text Box 32">
+              <a:extLst>
+                <a:ext uri="{FF2B5EF4-FFF2-40B4-BE49-F238E27FC236}">
+                  <a16:creationId xmlns:a16="http://schemas.microsoft.com/office/drawing/2014/main" id="{8BDD5CD8-E64E-3212-9007-DD9DB71D9AC9}"/>
+                </a:ext>
+              </a:extLst>
+            </p:cNvPr>
+            <p:cNvSpPr txBox="1">
+              <a:spLocks noChangeArrowheads="1"/>
+            </p:cNvSpPr>
+            <p:nvPr/>
+          </p:nvSpPr>
+          <p:spPr bwMode="auto">
+            <a:xfrm>
+              <a:off x="1323495" y="2942212"/>
+              <a:ext cx="321000" cy="215444"/>
+            </a:xfrm>
+            <a:prstGeom prst="rect">
+              <a:avLst/>
+            </a:prstGeom>
+            <a:solidFill>
+              <a:schemeClr val="bg1"/>
+            </a:solidFill>
+            <a:ln w="9525">
+              <a:noFill/>
+              <a:miter lim="800000"/>
+              <a:headEnd/>
+              <a:tailEnd/>
+            </a:ln>
+            <a:effectLst/>
+          </p:spPr>
+          <p:txBody>
+            <a:bodyPr wrap="square" lIns="0" tIns="0" rIns="0" bIns="0">
+              <a:spAutoFit/>
+            </a:bodyPr>
+            <a:lstStyle/>
+            <a:p>
+              <a:pPr>
+                <a:spcBef>
+                  <a:spcPct val="50000"/>
+                </a:spcBef>
+              </a:pPr>
+              <a:r>
+                <a:rPr lang="en-US" sz="1400" dirty="0">
+                  <a:latin typeface="+mn-lt"/>
+                </a:rPr>
+                <a:t>2-4</a:t>
+              </a:r>
+            </a:p>
+          </p:txBody>
+        </p:sp>
+        <p:sp>
+          <p:nvSpPr>
+            <p:cNvPr id="34" name="Text Box 33">
+              <a:extLst>
+                <a:ext uri="{FF2B5EF4-FFF2-40B4-BE49-F238E27FC236}">
+                  <a16:creationId xmlns:a16="http://schemas.microsoft.com/office/drawing/2014/main" id="{4662B87B-69ED-345D-3F78-BD2826EF7F31}"/>
+                </a:ext>
+              </a:extLst>
+            </p:cNvPr>
+            <p:cNvSpPr txBox="1">
+              <a:spLocks noChangeArrowheads="1"/>
+            </p:cNvSpPr>
+            <p:nvPr/>
+          </p:nvSpPr>
+          <p:spPr bwMode="auto">
+            <a:xfrm>
+              <a:off x="1439667" y="3771069"/>
+              <a:ext cx="113814" cy="215444"/>
+            </a:xfrm>
+            <a:prstGeom prst="rect">
+              <a:avLst/>
+            </a:prstGeom>
+            <a:solidFill>
+              <a:schemeClr val="bg1"/>
+            </a:solidFill>
+            <a:ln w="9525">
+              <a:noFill/>
+              <a:miter lim="800000"/>
+              <a:headEnd/>
+              <a:tailEnd/>
+            </a:ln>
+            <a:effectLst/>
+          </p:spPr>
+          <p:txBody>
+            <a:bodyPr wrap="none" lIns="0" tIns="0" rIns="0" bIns="0">
+              <a:spAutoFit/>
+            </a:bodyPr>
+            <a:lstStyle/>
+            <a:p>
+              <a:pPr>
+                <a:spcBef>
+                  <a:spcPct val="50000"/>
+                </a:spcBef>
+              </a:pPr>
+              <a:r>
+                <a:rPr lang="en-US" sz="1400" dirty="0">
+                  <a:latin typeface="+mn-lt"/>
+                </a:rPr>
+                <a:t>3</a:t>
+              </a:r>
+            </a:p>
+          </p:txBody>
+        </p:sp>
+        <p:sp>
+          <p:nvSpPr>
+            <p:cNvPr id="36" name="Text Box 36">
+              <a:extLst>
+                <a:ext uri="{FF2B5EF4-FFF2-40B4-BE49-F238E27FC236}">
+                  <a16:creationId xmlns:a16="http://schemas.microsoft.com/office/drawing/2014/main" id="{C85621B3-9F45-C217-D868-27804E732731}"/>
+                </a:ext>
+              </a:extLst>
+            </p:cNvPr>
+            <p:cNvSpPr txBox="1">
+              <a:spLocks noChangeArrowheads="1"/>
+            </p:cNvSpPr>
+            <p:nvPr/>
+          </p:nvSpPr>
+          <p:spPr bwMode="auto">
+            <a:xfrm>
+              <a:off x="2343880" y="4179388"/>
+              <a:ext cx="113814" cy="215444"/>
+            </a:xfrm>
+            <a:prstGeom prst="rect">
+              <a:avLst/>
+            </a:prstGeom>
+            <a:solidFill>
+              <a:schemeClr val="bg1"/>
+            </a:solidFill>
+            <a:ln w="9525">
+              <a:noFill/>
+              <a:miter lim="800000"/>
+              <a:headEnd/>
+              <a:tailEnd/>
+            </a:ln>
+            <a:effectLst/>
+          </p:spPr>
+          <p:txBody>
+            <a:bodyPr wrap="none" lIns="0" tIns="0" rIns="0" bIns="0">
+              <a:spAutoFit/>
+            </a:bodyPr>
+            <a:lstStyle/>
+            <a:p>
+              <a:pPr>
+                <a:spcBef>
+                  <a:spcPct val="50000"/>
+                </a:spcBef>
+              </a:pPr>
+              <a:r>
+                <a:rPr lang="en-US" sz="1400" dirty="0">
+                  <a:latin typeface="+mn-lt"/>
+                </a:rPr>
+                <a:t>2</a:t>
+              </a:r>
+            </a:p>
+          </p:txBody>
+        </p:sp>
+        <p:sp>
+          <p:nvSpPr>
+            <p:cNvPr id="43" name="Text Box 43">
+              <a:extLst>
+                <a:ext uri="{FF2B5EF4-FFF2-40B4-BE49-F238E27FC236}">
+                  <a16:creationId xmlns:a16="http://schemas.microsoft.com/office/drawing/2014/main" id="{08D64361-E0B1-EF36-EF7C-2D0A44F0A7B8}"/>
+                </a:ext>
+              </a:extLst>
+            </p:cNvPr>
+            <p:cNvSpPr txBox="1">
+              <a:spLocks noChangeArrowheads="1"/>
+            </p:cNvSpPr>
+            <p:nvPr/>
+          </p:nvSpPr>
+          <p:spPr bwMode="auto">
+            <a:xfrm>
+              <a:off x="1669033" y="3366775"/>
+              <a:ext cx="113814" cy="215444"/>
+            </a:xfrm>
+            <a:prstGeom prst="rect">
+              <a:avLst/>
+            </a:prstGeom>
+            <a:solidFill>
+              <a:schemeClr val="bg1"/>
+            </a:solidFill>
+            <a:ln w="9525">
+              <a:noFill/>
+              <a:miter lim="800000"/>
+              <a:headEnd/>
+              <a:tailEnd/>
+            </a:ln>
+            <a:effectLst/>
+          </p:spPr>
+          <p:txBody>
+            <a:bodyPr wrap="none" lIns="0" tIns="0" rIns="0" bIns="0">
+              <a:spAutoFit/>
+            </a:bodyPr>
+            <a:lstStyle/>
+            <a:p>
+              <a:pPr>
+                <a:spcBef>
+                  <a:spcPct val="50000"/>
+                </a:spcBef>
+              </a:pPr>
+              <a:r>
+                <a:rPr lang="en-US" sz="1400" dirty="0">
+                  <a:latin typeface="+mn-lt"/>
+                </a:rPr>
+                <a:t>6</a:t>
+              </a:r>
+            </a:p>
+          </p:txBody>
+        </p:sp>
+        <p:sp>
+          <p:nvSpPr>
+            <p:cNvPr id="45" name="Text Box 45">
+              <a:extLst>
+                <a:ext uri="{FF2B5EF4-FFF2-40B4-BE49-F238E27FC236}">
+                  <a16:creationId xmlns:a16="http://schemas.microsoft.com/office/drawing/2014/main" id="{5FB4CE64-727A-E2D0-7620-6A1A8BA60009}"/>
+                </a:ext>
+              </a:extLst>
+            </p:cNvPr>
+            <p:cNvSpPr txBox="1">
+              <a:spLocks noChangeArrowheads="1"/>
+            </p:cNvSpPr>
+            <p:nvPr/>
+          </p:nvSpPr>
+          <p:spPr bwMode="auto">
+            <a:xfrm>
+              <a:off x="2368707" y="2533640"/>
+              <a:ext cx="309380" cy="215444"/>
+            </a:xfrm>
+            <a:prstGeom prst="rect">
+              <a:avLst/>
+            </a:prstGeom>
+            <a:solidFill>
+              <a:schemeClr val="bg1"/>
+            </a:solidFill>
+            <a:ln w="9525">
+              <a:noFill/>
+              <a:miter lim="800000"/>
+              <a:headEnd/>
+              <a:tailEnd/>
+            </a:ln>
+            <a:effectLst/>
+          </p:spPr>
+          <p:txBody>
+            <a:bodyPr wrap="none" lIns="0" tIns="0" rIns="0" bIns="0">
+              <a:spAutoFit/>
+            </a:bodyPr>
+            <a:lstStyle/>
+            <a:p>
+              <a:pPr>
+                <a:spcBef>
+                  <a:spcPct val="50000"/>
+                </a:spcBef>
+              </a:pPr>
+              <a:r>
+                <a:rPr lang="en-US" sz="1400" dirty="0">
+                  <a:latin typeface="+mn-lt"/>
+                </a:rPr>
+                <a:t>3-5</a:t>
+              </a:r>
+            </a:p>
+          </p:txBody>
+        </p:sp>
+        <p:sp>
+          <p:nvSpPr>
+            <p:cNvPr id="46" name="Text Box 46">
+              <a:extLst>
+                <a:ext uri="{FF2B5EF4-FFF2-40B4-BE49-F238E27FC236}">
+                  <a16:creationId xmlns:a16="http://schemas.microsoft.com/office/drawing/2014/main" id="{E9A3B03D-7E64-1DE6-7799-694401C5F4F1}"/>
+                </a:ext>
+              </a:extLst>
+            </p:cNvPr>
+            <p:cNvSpPr txBox="1">
+              <a:spLocks noChangeArrowheads="1"/>
+            </p:cNvSpPr>
+            <p:nvPr/>
+          </p:nvSpPr>
+          <p:spPr bwMode="auto">
+            <a:xfrm>
+              <a:off x="2615394" y="2958777"/>
+              <a:ext cx="113814" cy="215444"/>
+            </a:xfrm>
+            <a:prstGeom prst="rect">
+              <a:avLst/>
+            </a:prstGeom>
+            <a:solidFill>
+              <a:schemeClr val="bg1"/>
+            </a:solidFill>
+            <a:ln w="9525">
+              <a:noFill/>
+              <a:miter lim="800000"/>
+              <a:headEnd/>
+              <a:tailEnd/>
+            </a:ln>
+            <a:effectLst/>
+          </p:spPr>
+          <p:txBody>
+            <a:bodyPr wrap="none" lIns="0" tIns="0" rIns="0" bIns="0">
+              <a:spAutoFit/>
+            </a:bodyPr>
+            <a:lstStyle/>
+            <a:p>
+              <a:pPr>
+                <a:spcBef>
+                  <a:spcPct val="50000"/>
+                </a:spcBef>
+              </a:pPr>
+              <a:r>
+                <a:rPr lang="en-US" sz="1400" dirty="0">
+                  <a:latin typeface="+mn-lt"/>
+                </a:rPr>
+                <a:t>3</a:t>
+              </a:r>
+            </a:p>
+          </p:txBody>
+        </p:sp>
+        <p:sp>
+          <p:nvSpPr>
+            <p:cNvPr id="47" name="Text Box 47">
+              <a:extLst>
+                <a:ext uri="{FF2B5EF4-FFF2-40B4-BE49-F238E27FC236}">
+                  <a16:creationId xmlns:a16="http://schemas.microsoft.com/office/drawing/2014/main" id="{40C976DD-3AE0-924C-2BBC-826EE7F0F035}"/>
+                </a:ext>
+              </a:extLst>
+            </p:cNvPr>
+            <p:cNvSpPr txBox="1">
+              <a:spLocks noChangeArrowheads="1"/>
+            </p:cNvSpPr>
+            <p:nvPr/>
+          </p:nvSpPr>
+          <p:spPr bwMode="auto">
+            <a:xfrm>
+              <a:off x="1912308" y="2928308"/>
+              <a:ext cx="356711" cy="215444"/>
+            </a:xfrm>
+            <a:prstGeom prst="rect">
+              <a:avLst/>
+            </a:prstGeom>
+            <a:solidFill>
+              <a:schemeClr val="bg1"/>
+            </a:solidFill>
+            <a:ln w="9525">
+              <a:noFill/>
+              <a:miter lim="800000"/>
+              <a:headEnd/>
+              <a:tailEnd/>
+            </a:ln>
+            <a:effectLst/>
+          </p:spPr>
+          <p:txBody>
+            <a:bodyPr wrap="square" lIns="0" tIns="0" rIns="0" bIns="0">
+              <a:spAutoFit/>
+            </a:bodyPr>
+            <a:lstStyle/>
+            <a:p>
+              <a:pPr algn="ctr">
+                <a:spcBef>
+                  <a:spcPct val="50000"/>
+                </a:spcBef>
+              </a:pPr>
+              <a:r>
+                <a:rPr lang="en-US" sz="1400" dirty="0">
+                  <a:latin typeface="+mn-lt"/>
+                </a:rPr>
+                <a:t>2</a:t>
+              </a:r>
+            </a:p>
+          </p:txBody>
+        </p:sp>
+        <p:sp>
+          <p:nvSpPr>
+            <p:cNvPr id="67" name="Text Box 37">
+              <a:extLst>
+                <a:ext uri="{FF2B5EF4-FFF2-40B4-BE49-F238E27FC236}">
+                  <a16:creationId xmlns:a16="http://schemas.microsoft.com/office/drawing/2014/main" id="{C2E73F5B-0B1C-2131-1B8E-76A10E34C7D1}"/>
+                </a:ext>
+              </a:extLst>
+            </p:cNvPr>
+            <p:cNvSpPr txBox="1">
+              <a:spLocks noChangeArrowheads="1"/>
+            </p:cNvSpPr>
+            <p:nvPr/>
+          </p:nvSpPr>
+          <p:spPr bwMode="auto">
+            <a:xfrm>
+              <a:off x="425004" y="2377712"/>
+              <a:ext cx="1259960" cy="215444"/>
+            </a:xfrm>
+            <a:prstGeom prst="rect">
+              <a:avLst/>
+            </a:prstGeom>
+            <a:noFill/>
+            <a:ln w="9525">
+              <a:noFill/>
+              <a:miter lim="800000"/>
+              <a:headEnd/>
+              <a:tailEnd/>
+            </a:ln>
+            <a:effectLst/>
+          </p:spPr>
+          <p:txBody>
+            <a:bodyPr wrap="none" lIns="0" tIns="0" rIns="0" bIns="0">
+              <a:spAutoFit/>
+            </a:bodyPr>
+            <a:lstStyle/>
+            <a:p>
+              <a:pPr>
+                <a:spcBef>
+                  <a:spcPct val="50000"/>
+                </a:spcBef>
+              </a:pPr>
+              <a:r>
+                <a:rPr lang="en-US" sz="1400" i="1" dirty="0">
+                  <a:latin typeface="+mn-lt"/>
+                </a:rPr>
+                <a:t>floor–capacity</a:t>
+              </a:r>
+            </a:p>
+          </p:txBody>
+        </p:sp>
+        <p:cxnSp>
+          <p:nvCxnSpPr>
+            <p:cNvPr id="71" name="Straight Arrow Connector 70">
+              <a:extLst>
+                <a:ext uri="{FF2B5EF4-FFF2-40B4-BE49-F238E27FC236}">
+                  <a16:creationId xmlns:a16="http://schemas.microsoft.com/office/drawing/2014/main" id="{732F7323-3A76-9CA9-A30F-3A93377E4967}"/>
+                </a:ext>
+              </a:extLst>
+            </p:cNvPr>
+            <p:cNvCxnSpPr>
+              <a:cxnSpLocks/>
+            </p:cNvCxnSpPr>
+            <p:nvPr/>
+          </p:nvCxnSpPr>
+          <p:spPr bwMode="auto">
+            <a:xfrm>
+              <a:off x="1081779" y="2645561"/>
+              <a:ext cx="257403" cy="241938"/>
+            </a:xfrm>
+            <a:prstGeom prst="straightConnector1">
+              <a:avLst/>
+            </a:prstGeom>
+            <a:solidFill>
+              <a:schemeClr val="accent1"/>
+            </a:solidFill>
+            <a:ln w="12700" cap="flat" cmpd="sng" algn="ctr">
+              <a:solidFill>
+                <a:schemeClr val="tx1"/>
+              </a:solidFill>
+              <a:prstDash val="solid"/>
+              <a:round/>
+              <a:headEnd type="none" w="sm" len="sm"/>
+              <a:tailEnd type="arrow"/>
+            </a:ln>
+            <a:effectLst/>
+          </p:spPr>
+        </p:cxnSp>
+        <p:sp>
+          <p:nvSpPr>
+            <p:cNvPr id="73" name="Text Box 34">
+              <a:extLst>
+                <a:ext uri="{FF2B5EF4-FFF2-40B4-BE49-F238E27FC236}">
+                  <a16:creationId xmlns:a16="http://schemas.microsoft.com/office/drawing/2014/main" id="{983646B0-9FC8-4680-63E1-BE86E2CCFECA}"/>
+                </a:ext>
+              </a:extLst>
+            </p:cNvPr>
+            <p:cNvSpPr txBox="1">
+              <a:spLocks noChangeArrowheads="1"/>
+            </p:cNvSpPr>
+            <p:nvPr/>
+          </p:nvSpPr>
+          <p:spPr bwMode="auto">
+            <a:xfrm>
+              <a:off x="3351507" y="3717608"/>
+              <a:ext cx="165832" cy="215444"/>
+            </a:xfrm>
+            <a:prstGeom prst="rect">
+              <a:avLst/>
+            </a:prstGeom>
+            <a:solidFill>
+              <a:schemeClr val="bg1"/>
+            </a:solidFill>
+            <a:ln w="9525">
+              <a:noFill/>
+              <a:miter lim="800000"/>
+              <a:headEnd/>
+              <a:tailEnd/>
+            </a:ln>
+            <a:effectLst/>
+          </p:spPr>
+          <p:txBody>
+            <a:bodyPr wrap="square" lIns="0" tIns="0" rIns="0" bIns="0">
+              <a:spAutoFit/>
+            </a:bodyPr>
+            <a:lstStyle/>
+            <a:p>
+              <a:pPr algn="ctr">
+                <a:spcBef>
+                  <a:spcPct val="50000"/>
+                </a:spcBef>
+              </a:pPr>
+              <a:r>
+                <a:rPr lang="en-US" sz="1400" dirty="0">
+                  <a:latin typeface="+mn-lt"/>
+                </a:rPr>
+                <a:t>2</a:t>
+              </a:r>
+            </a:p>
+          </p:txBody>
+        </p:sp>
+        <p:sp>
+          <p:nvSpPr>
+            <p:cNvPr id="74" name="Text Box 46">
+              <a:extLst>
+                <a:ext uri="{FF2B5EF4-FFF2-40B4-BE49-F238E27FC236}">
+                  <a16:creationId xmlns:a16="http://schemas.microsoft.com/office/drawing/2014/main" id="{EE506424-BBE0-B0D7-B3DA-9E258DAD18B6}"/>
+                </a:ext>
+              </a:extLst>
+            </p:cNvPr>
+            <p:cNvSpPr txBox="1">
+              <a:spLocks noChangeArrowheads="1"/>
+            </p:cNvSpPr>
+            <p:nvPr/>
+          </p:nvSpPr>
+          <p:spPr bwMode="auto">
+            <a:xfrm>
+              <a:off x="2825983" y="3034388"/>
+              <a:ext cx="65" cy="215444"/>
+            </a:xfrm>
+            <a:prstGeom prst="rect">
+              <a:avLst/>
+            </a:prstGeom>
+            <a:solidFill>
+              <a:schemeClr val="bg1"/>
+            </a:solidFill>
+            <a:ln w="9525">
+              <a:noFill/>
+              <a:miter lim="800000"/>
+              <a:headEnd/>
+              <a:tailEnd/>
+            </a:ln>
+            <a:effectLst/>
+          </p:spPr>
+          <p:txBody>
+            <a:bodyPr wrap="none" lIns="0" tIns="0" rIns="0" bIns="0">
+              <a:spAutoFit/>
+            </a:bodyPr>
+            <a:lstStyle/>
+            <a:p>
+              <a:pPr>
+                <a:spcBef>
+                  <a:spcPct val="50000"/>
+                </a:spcBef>
+              </a:pPr>
+              <a:endParaRPr lang="en-US" sz="1400" dirty="0">
+                <a:latin typeface="+mn-lt"/>
+              </a:endParaRPr>
+            </a:p>
+          </p:txBody>
+        </p:sp>
+        <p:sp>
+          <p:nvSpPr>
+            <p:cNvPr id="75" name="Line 30">
+              <a:extLst>
+                <a:ext uri="{FF2B5EF4-FFF2-40B4-BE49-F238E27FC236}">
+                  <a16:creationId xmlns:a16="http://schemas.microsoft.com/office/drawing/2014/main" id="{989027CC-9C27-5E4D-BDCD-65FE8E603E36}"/>
+                </a:ext>
+              </a:extLst>
+            </p:cNvPr>
+            <p:cNvSpPr>
+              <a:spLocks noChangeShapeType="1"/>
+            </p:cNvSpPr>
+            <p:nvPr/>
+          </p:nvSpPr>
+          <p:spPr bwMode="auto">
+            <a:xfrm flipV="1">
+              <a:off x="1981986" y="3586115"/>
+              <a:ext cx="334526" cy="578773"/>
+            </a:xfrm>
+            <a:prstGeom prst="line">
+              <a:avLst/>
+            </a:prstGeom>
+            <a:noFill/>
+            <a:ln w="12700" cap="flat" cmpd="sng" algn="ctr">
+              <a:solidFill>
+                <a:schemeClr val="tx1"/>
+              </a:solidFill>
+              <a:prstDash val="solid"/>
+              <a:round/>
+              <a:headEnd type="none" w="med" len="med"/>
+              <a:tailEnd type="triangle" w="med" len="med"/>
+            </a:ln>
+            <a:effectLst/>
+          </p:spPr>
+          <p:txBody>
+            <a:bodyPr/>
+            <a:lstStyle/>
+            <a:p>
+              <a:endParaRPr lang="en-US" sz="1800">
+                <a:latin typeface="+mn-lt"/>
+              </a:endParaRPr>
+            </a:p>
+          </p:txBody>
+        </p:sp>
+        <p:sp>
+          <p:nvSpPr>
+            <p:cNvPr id="76" name="Text Box 43">
+              <a:extLst>
+                <a:ext uri="{FF2B5EF4-FFF2-40B4-BE49-F238E27FC236}">
+                  <a16:creationId xmlns:a16="http://schemas.microsoft.com/office/drawing/2014/main" id="{4967C636-8BB2-B401-FC53-7B3DB1A0C4BD}"/>
+                </a:ext>
+              </a:extLst>
+            </p:cNvPr>
+            <p:cNvSpPr txBox="1">
+              <a:spLocks noChangeArrowheads="1"/>
+            </p:cNvSpPr>
+            <p:nvPr/>
+          </p:nvSpPr>
+          <p:spPr bwMode="auto">
+            <a:xfrm>
+              <a:off x="2068510" y="3777067"/>
+              <a:ext cx="113814" cy="215444"/>
+            </a:xfrm>
+            <a:prstGeom prst="rect">
+              <a:avLst/>
+            </a:prstGeom>
+            <a:solidFill>
+              <a:schemeClr val="bg1"/>
+            </a:solidFill>
+            <a:ln w="9525">
+              <a:noFill/>
+              <a:miter lim="800000"/>
+              <a:headEnd/>
+              <a:tailEnd/>
+            </a:ln>
+            <a:effectLst/>
+          </p:spPr>
+          <p:txBody>
+            <a:bodyPr wrap="none" lIns="0" tIns="0" rIns="0" bIns="0">
+              <a:spAutoFit/>
+            </a:bodyPr>
+            <a:lstStyle/>
+            <a:p>
+              <a:pPr>
+                <a:spcBef>
+                  <a:spcPct val="50000"/>
+                </a:spcBef>
+              </a:pPr>
+              <a:r>
+                <a:rPr lang="en-US" sz="1400" dirty="0">
+                  <a:latin typeface="+mn-lt"/>
+                </a:rPr>
+                <a:t>6</a:t>
+              </a:r>
+            </a:p>
+          </p:txBody>
+        </p:sp>
+        <p:sp>
+          <p:nvSpPr>
+            <p:cNvPr id="79" name="Line 19">
+              <a:extLst>
+                <a:ext uri="{FF2B5EF4-FFF2-40B4-BE49-F238E27FC236}">
+                  <a16:creationId xmlns:a16="http://schemas.microsoft.com/office/drawing/2014/main" id="{B6B5F842-0327-D294-2689-7C96FAA78536}"/>
+                </a:ext>
+              </a:extLst>
+            </p:cNvPr>
+            <p:cNvSpPr>
+              <a:spLocks noChangeShapeType="1"/>
+            </p:cNvSpPr>
+            <p:nvPr/>
+          </p:nvSpPr>
+          <p:spPr bwMode="auto">
+            <a:xfrm>
+              <a:off x="6746607" y="3503226"/>
+              <a:ext cx="468180" cy="621043"/>
+            </a:xfrm>
+            <a:prstGeom prst="line">
+              <a:avLst/>
+            </a:prstGeom>
+            <a:noFill/>
+            <a:ln w="12700" cap="flat" cmpd="sng" algn="ctr">
+              <a:solidFill>
+                <a:schemeClr val="tx1"/>
+              </a:solidFill>
+              <a:prstDash val="solid"/>
+              <a:round/>
+              <a:headEnd type="none" w="med" len="med"/>
+              <a:tailEnd type="triangle" w="med" len="med"/>
+            </a:ln>
+            <a:effectLst/>
+          </p:spPr>
+          <p:txBody>
+            <a:bodyPr/>
+            <a:lstStyle/>
+            <a:p>
+              <a:endParaRPr lang="en-US" sz="1800">
+                <a:latin typeface="+mn-lt"/>
+              </a:endParaRPr>
+            </a:p>
+          </p:txBody>
+        </p:sp>
+        <p:sp>
+          <p:nvSpPr>
+            <p:cNvPr id="80" name="Text Box 34">
+              <a:extLst>
+                <a:ext uri="{FF2B5EF4-FFF2-40B4-BE49-F238E27FC236}">
+                  <a16:creationId xmlns:a16="http://schemas.microsoft.com/office/drawing/2014/main" id="{4A950415-3B26-DFAF-98EC-9F1056CA0724}"/>
+                </a:ext>
+              </a:extLst>
+            </p:cNvPr>
+            <p:cNvSpPr txBox="1">
+              <a:spLocks noChangeArrowheads="1"/>
+            </p:cNvSpPr>
+            <p:nvPr/>
+          </p:nvSpPr>
+          <p:spPr bwMode="auto">
+            <a:xfrm>
+              <a:off x="6766220" y="3694704"/>
+              <a:ext cx="395794" cy="215444"/>
+            </a:xfrm>
+            <a:prstGeom prst="rect">
+              <a:avLst/>
+            </a:prstGeom>
+            <a:solidFill>
+              <a:schemeClr val="bg1"/>
+            </a:solidFill>
+            <a:ln w="9525">
+              <a:noFill/>
+              <a:miter lim="800000"/>
+              <a:headEnd/>
+              <a:tailEnd/>
+            </a:ln>
+            <a:effectLst/>
+          </p:spPr>
+          <p:txBody>
+            <a:bodyPr wrap="square" lIns="0" tIns="0" rIns="0" bIns="0">
+              <a:spAutoFit/>
+            </a:bodyPr>
+            <a:lstStyle/>
+            <a:p>
+              <a:pPr algn="ctr">
+                <a:spcBef>
+                  <a:spcPct val="50000"/>
+                </a:spcBef>
+              </a:pPr>
+              <a:r>
+                <a:rPr lang="en-US" sz="1400" dirty="0">
+                  <a:latin typeface="+mn-lt"/>
+                </a:rPr>
+                <a:t>1</a:t>
+              </a:r>
+            </a:p>
+          </p:txBody>
+        </p:sp>
+        <p:sp>
+          <p:nvSpPr>
+            <p:cNvPr id="81" name="Oval 80">
+              <a:extLst>
+                <a:ext uri="{FF2B5EF4-FFF2-40B4-BE49-F238E27FC236}">
+                  <a16:creationId xmlns:a16="http://schemas.microsoft.com/office/drawing/2014/main" id="{83A99029-DF99-A3AC-81EA-639E4EE2E3E8}"/>
+                </a:ext>
+              </a:extLst>
+            </p:cNvPr>
+            <p:cNvSpPr>
+              <a:spLocks noChangeArrowheads="1"/>
+            </p:cNvSpPr>
+            <p:nvPr/>
+          </p:nvSpPr>
+          <p:spPr bwMode="auto">
+            <a:xfrm>
+              <a:off x="5246921" y="3271589"/>
+              <a:ext cx="263849" cy="272858"/>
+            </a:xfrm>
+            <a:prstGeom prst="ellipse">
+              <a:avLst/>
+            </a:prstGeom>
+            <a:solidFill>
+              <a:srgbClr val="CCFFFF"/>
+            </a:solidFill>
+            <a:ln w="9525">
+              <a:solidFill>
+                <a:schemeClr val="tx1"/>
+              </a:solidFill>
+              <a:round/>
+              <a:headEnd/>
+              <a:tailEnd/>
+            </a:ln>
+            <a:effectLst/>
+          </p:spPr>
+          <p:txBody>
+            <a:bodyPr wrap="none" anchor="ctr"/>
+            <a:lstStyle/>
+            <a:p>
+              <a:pPr algn="ctr"/>
+              <a:r>
+                <a:rPr lang="en-US" sz="1400" i="1">
+                  <a:latin typeface="+mn-lt"/>
+                </a:rPr>
+                <a:t>s</a:t>
+              </a:r>
+            </a:p>
+          </p:txBody>
+        </p:sp>
+        <p:sp>
+          <p:nvSpPr>
+            <p:cNvPr id="82" name="Oval 81">
+              <a:extLst>
+                <a:ext uri="{FF2B5EF4-FFF2-40B4-BE49-F238E27FC236}">
+                  <a16:creationId xmlns:a16="http://schemas.microsoft.com/office/drawing/2014/main" id="{6330F9A2-2AE7-FD36-73D4-D686C9391375}"/>
+                </a:ext>
+              </a:extLst>
+            </p:cNvPr>
+            <p:cNvSpPr>
+              <a:spLocks noChangeArrowheads="1"/>
+            </p:cNvSpPr>
+            <p:nvPr/>
+          </p:nvSpPr>
+          <p:spPr bwMode="auto">
+            <a:xfrm>
+              <a:off x="6507051" y="3260387"/>
+              <a:ext cx="263849" cy="272858"/>
+            </a:xfrm>
+            <a:prstGeom prst="ellipse">
+              <a:avLst/>
+            </a:prstGeom>
+            <a:solidFill>
+              <a:srgbClr val="CCFFFF"/>
+            </a:solidFill>
+            <a:ln w="9525">
+              <a:solidFill>
+                <a:schemeClr val="tx1"/>
+              </a:solidFill>
+              <a:round/>
+              <a:headEnd/>
+              <a:tailEnd/>
+            </a:ln>
+            <a:effectLst/>
+          </p:spPr>
+          <p:txBody>
+            <a:bodyPr wrap="none" anchor="ctr"/>
+            <a:lstStyle/>
+            <a:p>
+              <a:pPr algn="ctr"/>
+              <a:r>
+                <a:rPr lang="en-US" sz="1400" i="1">
+                  <a:latin typeface="+mn-lt"/>
+                </a:rPr>
+                <a:t>c</a:t>
+              </a:r>
+            </a:p>
+          </p:txBody>
+        </p:sp>
+        <p:sp>
+          <p:nvSpPr>
+            <p:cNvPr id="83" name="Oval 82">
+              <a:extLst>
+                <a:ext uri="{FF2B5EF4-FFF2-40B4-BE49-F238E27FC236}">
+                  <a16:creationId xmlns:a16="http://schemas.microsoft.com/office/drawing/2014/main" id="{9A56416B-4069-A19A-030C-53EB628172EC}"/>
+                </a:ext>
+              </a:extLst>
+            </p:cNvPr>
+            <p:cNvSpPr>
+              <a:spLocks noChangeArrowheads="1"/>
+            </p:cNvSpPr>
+            <p:nvPr/>
+          </p:nvSpPr>
+          <p:spPr bwMode="auto">
+            <a:xfrm>
+              <a:off x="6038465" y="4090163"/>
+              <a:ext cx="263849" cy="272858"/>
+            </a:xfrm>
+            <a:prstGeom prst="ellipse">
+              <a:avLst/>
+            </a:prstGeom>
+            <a:solidFill>
+              <a:srgbClr val="CCFFFF"/>
+            </a:solidFill>
+            <a:ln w="9525">
+              <a:solidFill>
+                <a:schemeClr val="tx1"/>
+              </a:solidFill>
+              <a:round/>
+              <a:headEnd/>
+              <a:tailEnd/>
+            </a:ln>
+            <a:effectLst/>
+          </p:spPr>
+          <p:txBody>
+            <a:bodyPr wrap="none" anchor="ctr"/>
+            <a:lstStyle/>
+            <a:p>
+              <a:pPr algn="ctr"/>
+              <a:r>
+                <a:rPr lang="en-US" sz="1400" i="1">
+                  <a:latin typeface="+mn-lt"/>
+                </a:rPr>
+                <a:t>d</a:t>
+              </a:r>
+            </a:p>
+          </p:txBody>
+        </p:sp>
+        <p:sp>
+          <p:nvSpPr>
+            <p:cNvPr id="84" name="Oval 83">
+              <a:extLst>
+                <a:ext uri="{FF2B5EF4-FFF2-40B4-BE49-F238E27FC236}">
+                  <a16:creationId xmlns:a16="http://schemas.microsoft.com/office/drawing/2014/main" id="{44D169C5-91F5-CD86-0EF1-F80EF5459391}"/>
+                </a:ext>
+              </a:extLst>
+            </p:cNvPr>
+            <p:cNvSpPr>
+              <a:spLocks noChangeArrowheads="1"/>
+            </p:cNvSpPr>
+            <p:nvPr/>
+          </p:nvSpPr>
+          <p:spPr bwMode="auto">
+            <a:xfrm>
+              <a:off x="7181804" y="4090163"/>
+              <a:ext cx="263849" cy="272858"/>
+            </a:xfrm>
+            <a:prstGeom prst="ellipse">
+              <a:avLst/>
+            </a:prstGeom>
+            <a:solidFill>
+              <a:srgbClr val="CCFFFF"/>
+            </a:solidFill>
+            <a:ln w="9525">
+              <a:solidFill>
+                <a:schemeClr val="tx1"/>
+              </a:solidFill>
+              <a:round/>
+              <a:headEnd/>
+              <a:tailEnd/>
+            </a:ln>
+            <a:effectLst/>
+          </p:spPr>
+          <p:txBody>
+            <a:bodyPr wrap="none" anchor="ctr"/>
+            <a:lstStyle/>
+            <a:p>
+              <a:pPr algn="ctr"/>
+              <a:r>
+                <a:rPr lang="en-US" sz="1400" i="1">
+                  <a:latin typeface="+mn-lt"/>
+                </a:rPr>
+                <a:t>g</a:t>
+              </a:r>
+            </a:p>
+          </p:txBody>
+        </p:sp>
+        <p:sp>
+          <p:nvSpPr>
+            <p:cNvPr id="85" name="Oval 84">
+              <a:extLst>
+                <a:ext uri="{FF2B5EF4-FFF2-40B4-BE49-F238E27FC236}">
+                  <a16:creationId xmlns:a16="http://schemas.microsoft.com/office/drawing/2014/main" id="{A777371D-B727-AF49-EE4A-8E7F03452126}"/>
+                </a:ext>
+              </a:extLst>
+            </p:cNvPr>
+            <p:cNvSpPr>
+              <a:spLocks noChangeArrowheads="1"/>
+            </p:cNvSpPr>
+            <p:nvPr/>
+          </p:nvSpPr>
+          <p:spPr bwMode="auto">
+            <a:xfrm>
+              <a:off x="7181804" y="2453015"/>
+              <a:ext cx="263849" cy="272858"/>
+            </a:xfrm>
+            <a:prstGeom prst="ellipse">
+              <a:avLst/>
+            </a:prstGeom>
+            <a:solidFill>
+              <a:srgbClr val="CCFFFF"/>
+            </a:solidFill>
+            <a:ln w="9525">
+              <a:solidFill>
+                <a:schemeClr val="tx1"/>
+              </a:solidFill>
+              <a:round/>
+              <a:headEnd/>
+              <a:tailEnd/>
+            </a:ln>
+            <a:effectLst/>
+          </p:spPr>
+          <p:txBody>
+            <a:bodyPr wrap="none" anchor="ctr"/>
+            <a:lstStyle/>
+            <a:p>
+              <a:pPr algn="ctr"/>
+              <a:r>
+                <a:rPr lang="en-US" sz="1400" i="1">
+                  <a:latin typeface="+mn-lt"/>
+                </a:rPr>
+                <a:t>e</a:t>
+              </a:r>
+            </a:p>
+          </p:txBody>
+        </p:sp>
+        <p:sp>
+          <p:nvSpPr>
+            <p:cNvPr id="86" name="Oval 85">
+              <a:extLst>
+                <a:ext uri="{FF2B5EF4-FFF2-40B4-BE49-F238E27FC236}">
+                  <a16:creationId xmlns:a16="http://schemas.microsoft.com/office/drawing/2014/main" id="{4418BF49-E3DB-3B3A-1D94-F56DEF4959D5}"/>
+                </a:ext>
+              </a:extLst>
+            </p:cNvPr>
+            <p:cNvSpPr>
+              <a:spLocks noChangeArrowheads="1"/>
+            </p:cNvSpPr>
+            <p:nvPr/>
+          </p:nvSpPr>
+          <p:spPr bwMode="auto">
+            <a:xfrm>
+              <a:off x="6038465" y="2453015"/>
+              <a:ext cx="263849" cy="272858"/>
+            </a:xfrm>
+            <a:prstGeom prst="ellipse">
+              <a:avLst/>
+            </a:prstGeom>
+            <a:solidFill>
+              <a:srgbClr val="CCFFFF"/>
+            </a:solidFill>
+            <a:ln w="9525">
+              <a:solidFill>
+                <a:schemeClr val="tx1"/>
+              </a:solidFill>
+              <a:round/>
+              <a:headEnd/>
+              <a:tailEnd/>
+            </a:ln>
+            <a:effectLst/>
+          </p:spPr>
+          <p:txBody>
+            <a:bodyPr wrap="none" anchor="ctr"/>
+            <a:lstStyle/>
+            <a:p>
+              <a:pPr algn="ctr"/>
+              <a:r>
+                <a:rPr lang="en-US" sz="1400" i="1">
+                  <a:latin typeface="+mn-lt"/>
+                </a:rPr>
+                <a:t>b</a:t>
+              </a:r>
+            </a:p>
+          </p:txBody>
+        </p:sp>
+        <p:sp>
+          <p:nvSpPr>
+            <p:cNvPr id="87" name="Oval 86">
+              <a:extLst>
+                <a:ext uri="{FF2B5EF4-FFF2-40B4-BE49-F238E27FC236}">
+                  <a16:creationId xmlns:a16="http://schemas.microsoft.com/office/drawing/2014/main" id="{AC608297-06C3-927A-5161-46595349CCFB}"/>
+                </a:ext>
+              </a:extLst>
+            </p:cNvPr>
+            <p:cNvSpPr>
+              <a:spLocks noChangeArrowheads="1"/>
+            </p:cNvSpPr>
+            <p:nvPr/>
+          </p:nvSpPr>
+          <p:spPr bwMode="auto">
+            <a:xfrm>
+              <a:off x="7843226" y="3237991"/>
+              <a:ext cx="263849" cy="272858"/>
+            </a:xfrm>
+            <a:prstGeom prst="ellipse">
+              <a:avLst/>
+            </a:prstGeom>
+            <a:solidFill>
+              <a:srgbClr val="CCFFFF"/>
+            </a:solidFill>
+            <a:ln w="9525">
+              <a:solidFill>
+                <a:schemeClr val="tx1"/>
+              </a:solidFill>
+              <a:round/>
+              <a:headEnd/>
+              <a:tailEnd/>
+            </a:ln>
+            <a:effectLst/>
+          </p:spPr>
+          <p:txBody>
+            <a:bodyPr wrap="none" anchor="ctr"/>
+            <a:lstStyle/>
+            <a:p>
+              <a:pPr algn="ctr"/>
+              <a:r>
+                <a:rPr lang="en-US" sz="1400" i="1" dirty="0">
+                  <a:latin typeface="+mn-lt"/>
+                </a:rPr>
+                <a:t>t</a:t>
+              </a:r>
+            </a:p>
+          </p:txBody>
+        </p:sp>
+        <p:sp>
+          <p:nvSpPr>
+            <p:cNvPr id="88" name="Line 15">
+              <a:extLst>
+                <a:ext uri="{FF2B5EF4-FFF2-40B4-BE49-F238E27FC236}">
+                  <a16:creationId xmlns:a16="http://schemas.microsoft.com/office/drawing/2014/main" id="{2D3E71C4-B92E-D87A-385B-1737909C6A62}"/>
+                </a:ext>
+              </a:extLst>
+            </p:cNvPr>
+            <p:cNvSpPr>
+              <a:spLocks noChangeShapeType="1"/>
+            </p:cNvSpPr>
+            <p:nvPr/>
+          </p:nvSpPr>
+          <p:spPr bwMode="auto">
+            <a:xfrm flipV="1">
+              <a:off x="5477788" y="2691766"/>
+              <a:ext cx="593657" cy="613930"/>
+            </a:xfrm>
+            <a:prstGeom prst="line">
+              <a:avLst/>
+            </a:prstGeom>
+            <a:noFill/>
+            <a:ln w="9525">
+              <a:solidFill>
+                <a:schemeClr val="tx1"/>
+              </a:solidFill>
+              <a:round/>
+              <a:headEnd/>
+              <a:tailEnd type="triangle" w="med" len="med"/>
+            </a:ln>
+            <a:effectLst/>
+          </p:spPr>
+          <p:txBody>
+            <a:bodyPr/>
+            <a:lstStyle/>
+            <a:p>
+              <a:endParaRPr lang="en-US" sz="1800">
+                <a:latin typeface="+mn-lt"/>
+              </a:endParaRPr>
+            </a:p>
+          </p:txBody>
+        </p:sp>
+        <p:sp>
+          <p:nvSpPr>
+            <p:cNvPr id="89" name="Line 16">
+              <a:extLst>
+                <a:ext uri="{FF2B5EF4-FFF2-40B4-BE49-F238E27FC236}">
+                  <a16:creationId xmlns:a16="http://schemas.microsoft.com/office/drawing/2014/main" id="{CF7AA0AF-76BD-367A-839C-D501DB370FA9}"/>
+                </a:ext>
+              </a:extLst>
+            </p:cNvPr>
+            <p:cNvSpPr>
+              <a:spLocks noChangeShapeType="1"/>
+            </p:cNvSpPr>
+            <p:nvPr/>
+          </p:nvSpPr>
+          <p:spPr bwMode="auto">
+            <a:xfrm flipV="1">
+              <a:off x="5510771" y="3416645"/>
+              <a:ext cx="971454" cy="2739"/>
+            </a:xfrm>
+            <a:prstGeom prst="line">
+              <a:avLst/>
+            </a:prstGeom>
+            <a:noFill/>
+            <a:ln w="9525">
+              <a:solidFill>
+                <a:schemeClr val="tx1"/>
+              </a:solidFill>
+              <a:round/>
+              <a:headEnd/>
+              <a:tailEnd type="triangle" w="med" len="med"/>
+            </a:ln>
+            <a:effectLst/>
+          </p:spPr>
+          <p:txBody>
+            <a:bodyPr/>
+            <a:lstStyle/>
+            <a:p>
+              <a:endParaRPr lang="en-US" sz="1800">
+                <a:latin typeface="+mn-lt"/>
+              </a:endParaRPr>
+            </a:p>
+          </p:txBody>
+        </p:sp>
+        <p:sp>
+          <p:nvSpPr>
+            <p:cNvPr id="90" name="Line 17">
+              <a:extLst>
+                <a:ext uri="{FF2B5EF4-FFF2-40B4-BE49-F238E27FC236}">
+                  <a16:creationId xmlns:a16="http://schemas.microsoft.com/office/drawing/2014/main" id="{0D872B0D-015C-01EF-C46E-922D6AE8F783}"/>
+                </a:ext>
+              </a:extLst>
+            </p:cNvPr>
+            <p:cNvSpPr>
+              <a:spLocks noChangeShapeType="1"/>
+            </p:cNvSpPr>
+            <p:nvPr/>
+          </p:nvSpPr>
+          <p:spPr bwMode="auto">
+            <a:xfrm>
+              <a:off x="5477788" y="3521709"/>
+              <a:ext cx="582663" cy="613930"/>
+            </a:xfrm>
+            <a:prstGeom prst="line">
+              <a:avLst/>
+            </a:prstGeom>
+            <a:noFill/>
+            <a:ln w="9525">
+              <a:solidFill>
+                <a:schemeClr val="tx1"/>
+              </a:solidFill>
+              <a:round/>
+              <a:headEnd/>
+              <a:tailEnd type="triangle" w="med" len="med"/>
+            </a:ln>
+            <a:effectLst/>
+          </p:spPr>
+          <p:txBody>
+            <a:bodyPr/>
+            <a:lstStyle/>
+            <a:p>
+              <a:endParaRPr lang="en-US" sz="1800">
+                <a:latin typeface="+mn-lt"/>
+              </a:endParaRPr>
+            </a:p>
+          </p:txBody>
+        </p:sp>
+        <p:sp>
+          <p:nvSpPr>
+            <p:cNvPr id="91" name="Line 18">
+              <a:extLst>
+                <a:ext uri="{FF2B5EF4-FFF2-40B4-BE49-F238E27FC236}">
+                  <a16:creationId xmlns:a16="http://schemas.microsoft.com/office/drawing/2014/main" id="{30B03D19-2294-7466-94B8-D1521481E04C}"/>
+                </a:ext>
+              </a:extLst>
+            </p:cNvPr>
+            <p:cNvSpPr>
+              <a:spLocks noChangeShapeType="1"/>
+            </p:cNvSpPr>
+            <p:nvPr/>
+          </p:nvSpPr>
+          <p:spPr bwMode="auto">
+            <a:xfrm>
+              <a:off x="6302313" y="4237959"/>
+              <a:ext cx="879494" cy="0"/>
+            </a:xfrm>
+            <a:prstGeom prst="line">
+              <a:avLst/>
+            </a:prstGeom>
+            <a:noFill/>
+            <a:ln w="12700" cap="flat" cmpd="sng" algn="ctr">
+              <a:solidFill>
+                <a:schemeClr val="tx1"/>
+              </a:solidFill>
+              <a:prstDash val="solid"/>
+              <a:round/>
+              <a:headEnd type="none" w="med" len="med"/>
+              <a:tailEnd type="triangle" w="med" len="med"/>
+            </a:ln>
+            <a:effectLst/>
+          </p:spPr>
+          <p:txBody>
+            <a:bodyPr/>
+            <a:lstStyle/>
+            <a:p>
+              <a:endParaRPr lang="en-US" sz="1800">
+                <a:latin typeface="+mn-lt"/>
+              </a:endParaRPr>
+            </a:p>
+          </p:txBody>
+        </p:sp>
+        <p:sp>
+          <p:nvSpPr>
+            <p:cNvPr id="92" name="Line 21">
+              <a:extLst>
+                <a:ext uri="{FF2B5EF4-FFF2-40B4-BE49-F238E27FC236}">
+                  <a16:creationId xmlns:a16="http://schemas.microsoft.com/office/drawing/2014/main" id="{C340EEAE-8302-4CC4-2FA5-C72F87E2D248}"/>
+                </a:ext>
+              </a:extLst>
+            </p:cNvPr>
+            <p:cNvSpPr>
+              <a:spLocks noChangeShapeType="1"/>
+            </p:cNvSpPr>
+            <p:nvPr/>
+          </p:nvSpPr>
+          <p:spPr bwMode="auto">
+            <a:xfrm flipV="1">
+              <a:off x="6731733" y="2691766"/>
+              <a:ext cx="483051" cy="601525"/>
+            </a:xfrm>
+            <a:prstGeom prst="line">
+              <a:avLst/>
+            </a:prstGeom>
+            <a:noFill/>
+            <a:ln w="12700" cap="flat" cmpd="sng" algn="ctr">
+              <a:solidFill>
+                <a:schemeClr val="tx1"/>
+              </a:solidFill>
+              <a:prstDash val="solid"/>
+              <a:round/>
+              <a:headEnd type="none" w="med" len="med"/>
+              <a:tailEnd type="triangle" w="med" len="med"/>
+            </a:ln>
+            <a:effectLst/>
+          </p:spPr>
+          <p:txBody>
+            <a:bodyPr/>
+            <a:lstStyle/>
+            <a:p>
+              <a:endParaRPr lang="en-US" sz="1800">
+                <a:latin typeface="+mn-lt"/>
+              </a:endParaRPr>
+            </a:p>
+          </p:txBody>
+        </p:sp>
+        <p:sp>
+          <p:nvSpPr>
+            <p:cNvPr id="93" name="Line 22">
+              <a:extLst>
+                <a:ext uri="{FF2B5EF4-FFF2-40B4-BE49-F238E27FC236}">
+                  <a16:creationId xmlns:a16="http://schemas.microsoft.com/office/drawing/2014/main" id="{E451760F-0D9D-78CB-712A-FF61A5B852C1}"/>
+                </a:ext>
+              </a:extLst>
+            </p:cNvPr>
+            <p:cNvSpPr>
+              <a:spLocks noChangeShapeType="1"/>
+            </p:cNvSpPr>
+            <p:nvPr/>
+          </p:nvSpPr>
+          <p:spPr bwMode="auto">
+            <a:xfrm>
+              <a:off x="6302313" y="2589446"/>
+              <a:ext cx="879494" cy="0"/>
+            </a:xfrm>
+            <a:prstGeom prst="line">
+              <a:avLst/>
+            </a:prstGeom>
+            <a:noFill/>
+            <a:ln w="9525">
+              <a:solidFill>
+                <a:schemeClr val="tx1"/>
+              </a:solidFill>
+              <a:round/>
+              <a:headEnd/>
+              <a:tailEnd type="triangle" w="med" len="med"/>
+            </a:ln>
+            <a:effectLst/>
+          </p:spPr>
+          <p:txBody>
+            <a:bodyPr/>
+            <a:lstStyle/>
+            <a:p>
+              <a:endParaRPr lang="en-US" sz="1800">
+                <a:latin typeface="+mn-lt"/>
+              </a:endParaRPr>
+            </a:p>
+          </p:txBody>
+        </p:sp>
+        <p:sp>
+          <p:nvSpPr>
+            <p:cNvPr id="94" name="Line 23">
+              <a:extLst>
+                <a:ext uri="{FF2B5EF4-FFF2-40B4-BE49-F238E27FC236}">
+                  <a16:creationId xmlns:a16="http://schemas.microsoft.com/office/drawing/2014/main" id="{E94B794D-591D-6A20-E78E-C28CF3C60F36}"/>
+                </a:ext>
+              </a:extLst>
+            </p:cNvPr>
+            <p:cNvSpPr>
+              <a:spLocks noChangeShapeType="1"/>
+            </p:cNvSpPr>
+            <p:nvPr/>
+          </p:nvSpPr>
+          <p:spPr bwMode="auto">
+            <a:xfrm>
+              <a:off x="7408529" y="2703137"/>
+              <a:ext cx="472321" cy="567454"/>
+            </a:xfrm>
+            <a:prstGeom prst="line">
+              <a:avLst/>
+            </a:prstGeom>
+            <a:noFill/>
+            <a:ln w="12700" cap="flat" cmpd="sng" algn="ctr">
+              <a:solidFill>
+                <a:schemeClr val="tx1"/>
+              </a:solidFill>
+              <a:prstDash val="solid"/>
+              <a:round/>
+              <a:headEnd type="none" w="med" len="med"/>
+              <a:tailEnd type="triangle" w="med" len="med"/>
+            </a:ln>
+            <a:effectLst/>
+          </p:spPr>
+          <p:txBody>
+            <a:bodyPr/>
+            <a:lstStyle/>
+            <a:p>
+              <a:endParaRPr lang="en-US" sz="1800">
+                <a:latin typeface="+mn-lt"/>
+              </a:endParaRPr>
+            </a:p>
+          </p:txBody>
+        </p:sp>
+        <p:sp>
+          <p:nvSpPr>
+            <p:cNvPr id="95" name="Line 30">
+              <a:extLst>
+                <a:ext uri="{FF2B5EF4-FFF2-40B4-BE49-F238E27FC236}">
+                  <a16:creationId xmlns:a16="http://schemas.microsoft.com/office/drawing/2014/main" id="{6FC52DEC-97A6-DA40-15F3-00689FE8ABB4}"/>
+                </a:ext>
+              </a:extLst>
+            </p:cNvPr>
+            <p:cNvSpPr>
+              <a:spLocks noChangeShapeType="1"/>
+            </p:cNvSpPr>
+            <p:nvPr/>
+          </p:nvSpPr>
+          <p:spPr bwMode="auto">
+            <a:xfrm flipV="1">
+              <a:off x="7376777" y="3483817"/>
+              <a:ext cx="525249" cy="639456"/>
+            </a:xfrm>
+            <a:prstGeom prst="line">
+              <a:avLst/>
+            </a:prstGeom>
+            <a:noFill/>
+            <a:ln w="12700" cap="flat" cmpd="sng" algn="ctr">
+              <a:solidFill>
+                <a:schemeClr val="tx1"/>
+              </a:solidFill>
+              <a:prstDash val="solid"/>
+              <a:round/>
+              <a:headEnd type="none" w="med" len="med"/>
+              <a:tailEnd type="triangle" w="med" len="med"/>
+            </a:ln>
+            <a:effectLst/>
+          </p:spPr>
+          <p:txBody>
+            <a:bodyPr/>
+            <a:lstStyle/>
+            <a:p>
+              <a:endParaRPr lang="en-US" sz="1800">
+                <a:latin typeface="+mn-lt"/>
+              </a:endParaRPr>
+            </a:p>
+          </p:txBody>
+        </p:sp>
+        <p:sp>
+          <p:nvSpPr>
+            <p:cNvPr id="96" name="Line 31">
+              <a:extLst>
+                <a:ext uri="{FF2B5EF4-FFF2-40B4-BE49-F238E27FC236}">
+                  <a16:creationId xmlns:a16="http://schemas.microsoft.com/office/drawing/2014/main" id="{C55069B2-2CA2-0DC2-23AF-336C7D81B4FF}"/>
+                </a:ext>
+              </a:extLst>
+            </p:cNvPr>
+            <p:cNvSpPr>
+              <a:spLocks noChangeShapeType="1"/>
+            </p:cNvSpPr>
+            <p:nvPr/>
+          </p:nvSpPr>
+          <p:spPr bwMode="auto">
+            <a:xfrm>
+              <a:off x="6203368" y="2714503"/>
+              <a:ext cx="334525" cy="578773"/>
+            </a:xfrm>
+            <a:prstGeom prst="line">
+              <a:avLst/>
+            </a:prstGeom>
+            <a:noFill/>
+            <a:ln w="9525">
+              <a:solidFill>
+                <a:schemeClr val="tx1"/>
+              </a:solidFill>
+              <a:round/>
+              <a:headEnd/>
+              <a:tailEnd type="triangle" w="med" len="med"/>
+            </a:ln>
+            <a:effectLst/>
+          </p:spPr>
+          <p:txBody>
+            <a:bodyPr/>
+            <a:lstStyle/>
+            <a:p>
+              <a:endParaRPr lang="en-US" sz="1800">
+                <a:latin typeface="+mn-lt"/>
+              </a:endParaRPr>
+            </a:p>
+          </p:txBody>
+        </p:sp>
+        <p:sp>
+          <p:nvSpPr>
+            <p:cNvPr id="97" name="Text Box 32">
+              <a:extLst>
+                <a:ext uri="{FF2B5EF4-FFF2-40B4-BE49-F238E27FC236}">
+                  <a16:creationId xmlns:a16="http://schemas.microsoft.com/office/drawing/2014/main" id="{0F4B513A-2888-8101-E4C0-63A8DE525EE3}"/>
+                </a:ext>
+              </a:extLst>
+            </p:cNvPr>
+            <p:cNvSpPr txBox="1">
+              <a:spLocks noChangeArrowheads="1"/>
+            </p:cNvSpPr>
+            <p:nvPr/>
+          </p:nvSpPr>
+          <p:spPr bwMode="auto">
+            <a:xfrm>
+              <a:off x="5459995" y="3020775"/>
+              <a:ext cx="316325" cy="215444"/>
+            </a:xfrm>
+            <a:prstGeom prst="rect">
+              <a:avLst/>
+            </a:prstGeom>
+            <a:solidFill>
+              <a:schemeClr val="bg1"/>
+            </a:solidFill>
+            <a:ln w="9525">
+              <a:noFill/>
+              <a:miter lim="800000"/>
+              <a:headEnd/>
+              <a:tailEnd/>
+            </a:ln>
+            <a:effectLst/>
+          </p:spPr>
+          <p:txBody>
+            <a:bodyPr wrap="square" lIns="0" tIns="0" rIns="0" bIns="0">
+              <a:spAutoFit/>
+            </a:bodyPr>
+            <a:lstStyle/>
+            <a:p>
+              <a:pPr>
+                <a:spcBef>
+                  <a:spcPct val="50000"/>
+                </a:spcBef>
+              </a:pPr>
+              <a:r>
+                <a:rPr lang="en-US" sz="1400" dirty="0">
+                  <a:latin typeface="+mn-lt"/>
+                </a:rPr>
+                <a:t>2/1</a:t>
+              </a:r>
+            </a:p>
+          </p:txBody>
+        </p:sp>
+        <p:sp>
+          <p:nvSpPr>
+            <p:cNvPr id="98" name="Text Box 33">
+              <a:extLst>
+                <a:ext uri="{FF2B5EF4-FFF2-40B4-BE49-F238E27FC236}">
+                  <a16:creationId xmlns:a16="http://schemas.microsoft.com/office/drawing/2014/main" id="{5825F0A3-3C32-317E-DB24-3C1B01E06078}"/>
+                </a:ext>
+              </a:extLst>
+            </p:cNvPr>
+            <p:cNvSpPr txBox="1">
+              <a:spLocks noChangeArrowheads="1"/>
+            </p:cNvSpPr>
+            <p:nvPr/>
+          </p:nvSpPr>
+          <p:spPr bwMode="auto">
+            <a:xfrm>
+              <a:off x="5703753" y="3714954"/>
+              <a:ext cx="113814" cy="215444"/>
+            </a:xfrm>
+            <a:prstGeom prst="rect">
+              <a:avLst/>
+            </a:prstGeom>
+            <a:solidFill>
+              <a:schemeClr val="bg1"/>
+            </a:solidFill>
+            <a:ln w="9525">
+              <a:noFill/>
+              <a:miter lim="800000"/>
+              <a:headEnd/>
+              <a:tailEnd/>
+            </a:ln>
+            <a:effectLst/>
+          </p:spPr>
+          <p:txBody>
+            <a:bodyPr wrap="none" lIns="0" tIns="0" rIns="0" bIns="0">
+              <a:spAutoFit/>
+            </a:bodyPr>
+            <a:lstStyle/>
+            <a:p>
+              <a:pPr>
+                <a:spcBef>
+                  <a:spcPct val="50000"/>
+                </a:spcBef>
+              </a:pPr>
+              <a:r>
+                <a:rPr lang="en-US" sz="1400" dirty="0">
+                  <a:latin typeface="+mn-lt"/>
+                </a:rPr>
+                <a:t>3</a:t>
+              </a:r>
+            </a:p>
+          </p:txBody>
+        </p:sp>
+        <p:sp>
+          <p:nvSpPr>
+            <p:cNvPr id="99" name="Text Box 36">
+              <a:extLst>
+                <a:ext uri="{FF2B5EF4-FFF2-40B4-BE49-F238E27FC236}">
+                  <a16:creationId xmlns:a16="http://schemas.microsoft.com/office/drawing/2014/main" id="{5649558F-6D79-C1A2-F76A-1C30F0F60BF7}"/>
+                </a:ext>
+              </a:extLst>
+            </p:cNvPr>
+            <p:cNvSpPr txBox="1">
+              <a:spLocks noChangeArrowheads="1"/>
+            </p:cNvSpPr>
+            <p:nvPr/>
+          </p:nvSpPr>
+          <p:spPr bwMode="auto">
+            <a:xfrm>
+              <a:off x="6664674" y="4123273"/>
+              <a:ext cx="113814" cy="215444"/>
+            </a:xfrm>
+            <a:prstGeom prst="rect">
+              <a:avLst/>
+            </a:prstGeom>
+            <a:solidFill>
+              <a:schemeClr val="bg1"/>
+            </a:solidFill>
+            <a:ln w="9525">
+              <a:noFill/>
+              <a:miter lim="800000"/>
+              <a:headEnd/>
+              <a:tailEnd/>
+            </a:ln>
+            <a:effectLst/>
+          </p:spPr>
+          <p:txBody>
+            <a:bodyPr wrap="none" lIns="0" tIns="0" rIns="0" bIns="0">
+              <a:spAutoFit/>
+            </a:bodyPr>
+            <a:lstStyle/>
+            <a:p>
+              <a:pPr>
+                <a:spcBef>
+                  <a:spcPct val="50000"/>
+                </a:spcBef>
+              </a:pPr>
+              <a:r>
+                <a:rPr lang="en-US" sz="1400" dirty="0">
+                  <a:latin typeface="+mn-lt"/>
+                </a:rPr>
+                <a:t>2</a:t>
+              </a:r>
+            </a:p>
+          </p:txBody>
+        </p:sp>
+        <p:sp>
+          <p:nvSpPr>
+            <p:cNvPr id="100" name="Text Box 43">
+              <a:extLst>
+                <a:ext uri="{FF2B5EF4-FFF2-40B4-BE49-F238E27FC236}">
+                  <a16:creationId xmlns:a16="http://schemas.microsoft.com/office/drawing/2014/main" id="{3C2B8997-E560-B915-8974-CF8BF3DC4F89}"/>
+                </a:ext>
+              </a:extLst>
+            </p:cNvPr>
+            <p:cNvSpPr txBox="1">
+              <a:spLocks noChangeArrowheads="1"/>
+            </p:cNvSpPr>
+            <p:nvPr/>
+          </p:nvSpPr>
+          <p:spPr bwMode="auto">
+            <a:xfrm>
+              <a:off x="5826796" y="3310660"/>
+              <a:ext cx="309380" cy="215444"/>
+            </a:xfrm>
+            <a:prstGeom prst="rect">
+              <a:avLst/>
+            </a:prstGeom>
+            <a:solidFill>
+              <a:schemeClr val="bg1"/>
+            </a:solidFill>
+            <a:ln w="9525">
+              <a:noFill/>
+              <a:miter lim="800000"/>
+              <a:headEnd/>
+              <a:tailEnd/>
+            </a:ln>
+            <a:effectLst/>
+          </p:spPr>
+          <p:txBody>
+            <a:bodyPr wrap="none" lIns="0" tIns="0" rIns="0" bIns="0">
+              <a:spAutoFit/>
+            </a:bodyPr>
+            <a:lstStyle/>
+            <a:p>
+              <a:pPr>
+                <a:spcBef>
+                  <a:spcPct val="50000"/>
+                </a:spcBef>
+              </a:pPr>
+              <a:r>
+                <a:rPr lang="en-US" sz="1400" dirty="0">
+                  <a:latin typeface="+mn-lt"/>
+                </a:rPr>
+                <a:t>6/1</a:t>
+              </a:r>
+            </a:p>
+          </p:txBody>
+        </p:sp>
+        <p:sp>
+          <p:nvSpPr>
+            <p:cNvPr id="101" name="Text Box 45">
+              <a:extLst>
+                <a:ext uri="{FF2B5EF4-FFF2-40B4-BE49-F238E27FC236}">
+                  <a16:creationId xmlns:a16="http://schemas.microsoft.com/office/drawing/2014/main" id="{6CA6557E-D9CF-E46F-F30D-5899D815A8FA}"/>
+                </a:ext>
+              </a:extLst>
+            </p:cNvPr>
+            <p:cNvSpPr txBox="1">
+              <a:spLocks noChangeArrowheads="1"/>
+            </p:cNvSpPr>
+            <p:nvPr/>
+          </p:nvSpPr>
+          <p:spPr bwMode="auto">
+            <a:xfrm>
+              <a:off x="6611527" y="2477525"/>
+              <a:ext cx="113814" cy="215444"/>
+            </a:xfrm>
+            <a:prstGeom prst="rect">
+              <a:avLst/>
+            </a:prstGeom>
+            <a:solidFill>
+              <a:schemeClr val="bg1"/>
+            </a:solidFill>
+            <a:ln w="9525">
+              <a:noFill/>
+              <a:miter lim="800000"/>
+              <a:headEnd/>
+              <a:tailEnd/>
+            </a:ln>
+            <a:effectLst/>
+          </p:spPr>
+          <p:txBody>
+            <a:bodyPr wrap="none" lIns="0" tIns="0" rIns="0" bIns="0">
+              <a:spAutoFit/>
+            </a:bodyPr>
+            <a:lstStyle/>
+            <a:p>
+              <a:pPr>
+                <a:spcBef>
+                  <a:spcPct val="50000"/>
+                </a:spcBef>
+              </a:pPr>
+              <a:r>
+                <a:rPr lang="en-US" sz="1400" dirty="0">
+                  <a:latin typeface="+mn-lt"/>
+                </a:rPr>
+                <a:t>2</a:t>
+              </a:r>
+            </a:p>
+          </p:txBody>
+        </p:sp>
+        <p:sp>
+          <p:nvSpPr>
+            <p:cNvPr id="102" name="Text Box 46">
+              <a:extLst>
+                <a:ext uri="{FF2B5EF4-FFF2-40B4-BE49-F238E27FC236}">
+                  <a16:creationId xmlns:a16="http://schemas.microsoft.com/office/drawing/2014/main" id="{4817C851-C85E-FB07-6BAA-AC280BC188E4}"/>
+                </a:ext>
+              </a:extLst>
+            </p:cNvPr>
+            <p:cNvSpPr txBox="1">
+              <a:spLocks noChangeArrowheads="1"/>
+            </p:cNvSpPr>
+            <p:nvPr/>
+          </p:nvSpPr>
+          <p:spPr bwMode="auto">
+            <a:xfrm>
+              <a:off x="6787336" y="2994810"/>
+              <a:ext cx="113814" cy="215444"/>
+            </a:xfrm>
+            <a:prstGeom prst="rect">
+              <a:avLst/>
+            </a:prstGeom>
+            <a:solidFill>
+              <a:schemeClr val="bg1"/>
+            </a:solidFill>
+            <a:ln w="9525">
+              <a:noFill/>
+              <a:miter lim="800000"/>
+              <a:headEnd/>
+              <a:tailEnd/>
+            </a:ln>
+            <a:effectLst/>
+          </p:spPr>
+          <p:txBody>
+            <a:bodyPr wrap="none" lIns="0" tIns="0" rIns="0" bIns="0">
+              <a:spAutoFit/>
+            </a:bodyPr>
+            <a:lstStyle/>
+            <a:p>
+              <a:pPr>
+                <a:spcBef>
+                  <a:spcPct val="50000"/>
+                </a:spcBef>
+              </a:pPr>
+              <a:r>
+                <a:rPr lang="en-US" sz="1400" dirty="0">
+                  <a:latin typeface="+mn-lt"/>
+                </a:rPr>
+                <a:t>3</a:t>
+              </a:r>
+            </a:p>
+          </p:txBody>
+        </p:sp>
+        <p:sp>
+          <p:nvSpPr>
+            <p:cNvPr id="103" name="Text Box 47">
+              <a:extLst>
+                <a:ext uri="{FF2B5EF4-FFF2-40B4-BE49-F238E27FC236}">
+                  <a16:creationId xmlns:a16="http://schemas.microsoft.com/office/drawing/2014/main" id="{1838A0DD-B980-2E4E-24CB-6A1A8FC34FC5}"/>
+                </a:ext>
+              </a:extLst>
+            </p:cNvPr>
+            <p:cNvSpPr txBox="1">
+              <a:spLocks noChangeArrowheads="1"/>
+            </p:cNvSpPr>
+            <p:nvPr/>
+          </p:nvSpPr>
+          <p:spPr bwMode="auto">
+            <a:xfrm>
+              <a:off x="6176394" y="2872193"/>
+              <a:ext cx="356711" cy="215444"/>
+            </a:xfrm>
+            <a:prstGeom prst="rect">
+              <a:avLst/>
+            </a:prstGeom>
+            <a:solidFill>
+              <a:schemeClr val="bg1"/>
+            </a:solidFill>
+            <a:ln w="9525">
+              <a:noFill/>
+              <a:miter lim="800000"/>
+              <a:headEnd/>
+              <a:tailEnd/>
+            </a:ln>
+            <a:effectLst/>
+          </p:spPr>
+          <p:txBody>
+            <a:bodyPr wrap="square" lIns="0" tIns="0" rIns="0" bIns="0">
+              <a:spAutoFit/>
+            </a:bodyPr>
+            <a:lstStyle/>
+            <a:p>
+              <a:pPr algn="ctr">
+                <a:spcBef>
+                  <a:spcPct val="50000"/>
+                </a:spcBef>
+              </a:pPr>
+              <a:r>
+                <a:rPr lang="en-US" sz="1400" dirty="0">
+                  <a:latin typeface="+mn-lt"/>
+                </a:rPr>
+                <a:t>2</a:t>
+              </a:r>
+            </a:p>
+          </p:txBody>
+        </p:sp>
+        <p:sp>
+          <p:nvSpPr>
+            <p:cNvPr id="106" name="Text Box 34">
+              <a:extLst>
+                <a:ext uri="{FF2B5EF4-FFF2-40B4-BE49-F238E27FC236}">
+                  <a16:creationId xmlns:a16="http://schemas.microsoft.com/office/drawing/2014/main" id="{A7C34FAE-68B2-2BA6-9299-A528289A3700}"/>
+                </a:ext>
+              </a:extLst>
+            </p:cNvPr>
+            <p:cNvSpPr txBox="1">
+              <a:spLocks noChangeArrowheads="1"/>
+            </p:cNvSpPr>
+            <p:nvPr/>
+          </p:nvSpPr>
+          <p:spPr bwMode="auto">
+            <a:xfrm>
+              <a:off x="7523445" y="3661493"/>
+              <a:ext cx="314705" cy="215444"/>
+            </a:xfrm>
+            <a:prstGeom prst="rect">
+              <a:avLst/>
+            </a:prstGeom>
+            <a:solidFill>
+              <a:schemeClr val="bg1"/>
+            </a:solidFill>
+            <a:ln w="9525">
+              <a:noFill/>
+              <a:miter lim="800000"/>
+              <a:headEnd/>
+              <a:tailEnd/>
+            </a:ln>
+            <a:effectLst/>
+          </p:spPr>
+          <p:txBody>
+            <a:bodyPr wrap="square" lIns="0" tIns="0" rIns="0" bIns="0">
+              <a:spAutoFit/>
+            </a:bodyPr>
+            <a:lstStyle/>
+            <a:p>
+              <a:pPr algn="ctr">
+                <a:spcBef>
+                  <a:spcPct val="50000"/>
+                </a:spcBef>
+              </a:pPr>
+              <a:r>
+                <a:rPr lang="en-US" sz="1400" dirty="0">
+                  <a:latin typeface="+mn-lt"/>
+                </a:rPr>
+                <a:t>2/1</a:t>
+              </a:r>
+            </a:p>
+          </p:txBody>
+        </p:sp>
+        <p:sp>
+          <p:nvSpPr>
+            <p:cNvPr id="107" name="Text Box 46">
+              <a:extLst>
+                <a:ext uri="{FF2B5EF4-FFF2-40B4-BE49-F238E27FC236}">
+                  <a16:creationId xmlns:a16="http://schemas.microsoft.com/office/drawing/2014/main" id="{ACB50BE3-531F-E1AC-2830-595C1C5BDAE5}"/>
+                </a:ext>
+              </a:extLst>
+            </p:cNvPr>
+            <p:cNvSpPr txBox="1">
+              <a:spLocks noChangeArrowheads="1"/>
+            </p:cNvSpPr>
+            <p:nvPr/>
+          </p:nvSpPr>
+          <p:spPr bwMode="auto">
+            <a:xfrm>
+              <a:off x="7090069" y="2978273"/>
+              <a:ext cx="65" cy="215444"/>
+            </a:xfrm>
+            <a:prstGeom prst="rect">
+              <a:avLst/>
+            </a:prstGeom>
+            <a:solidFill>
+              <a:schemeClr val="bg1"/>
+            </a:solidFill>
+            <a:ln w="9525">
+              <a:noFill/>
+              <a:miter lim="800000"/>
+              <a:headEnd/>
+              <a:tailEnd/>
+            </a:ln>
+            <a:effectLst/>
+          </p:spPr>
+          <p:txBody>
+            <a:bodyPr wrap="none" lIns="0" tIns="0" rIns="0" bIns="0">
+              <a:spAutoFit/>
+            </a:bodyPr>
+            <a:lstStyle/>
+            <a:p>
+              <a:pPr>
+                <a:spcBef>
+                  <a:spcPct val="50000"/>
+                </a:spcBef>
+              </a:pPr>
+              <a:endParaRPr lang="en-US" sz="1400" dirty="0">
+                <a:latin typeface="+mn-lt"/>
+              </a:endParaRPr>
+            </a:p>
+          </p:txBody>
+        </p:sp>
+        <p:sp>
+          <p:nvSpPr>
+            <p:cNvPr id="108" name="Line 30">
+              <a:extLst>
+                <a:ext uri="{FF2B5EF4-FFF2-40B4-BE49-F238E27FC236}">
+                  <a16:creationId xmlns:a16="http://schemas.microsoft.com/office/drawing/2014/main" id="{90B6EF07-644E-D0DA-3526-E44FBDE7643F}"/>
+                </a:ext>
+              </a:extLst>
+            </p:cNvPr>
+            <p:cNvSpPr>
+              <a:spLocks noChangeShapeType="1"/>
+            </p:cNvSpPr>
+            <p:nvPr/>
+          </p:nvSpPr>
+          <p:spPr bwMode="auto">
+            <a:xfrm flipV="1">
+              <a:off x="6246072" y="3530000"/>
+              <a:ext cx="334526" cy="578773"/>
+            </a:xfrm>
+            <a:prstGeom prst="line">
+              <a:avLst/>
+            </a:prstGeom>
+            <a:noFill/>
+            <a:ln w="12700" cap="flat" cmpd="sng" algn="ctr">
+              <a:solidFill>
+                <a:schemeClr val="tx1"/>
+              </a:solidFill>
+              <a:prstDash val="solid"/>
+              <a:round/>
+              <a:headEnd type="none" w="med" len="med"/>
+              <a:tailEnd type="triangle" w="med" len="med"/>
+            </a:ln>
+            <a:effectLst/>
+          </p:spPr>
+          <p:txBody>
+            <a:bodyPr/>
+            <a:lstStyle/>
+            <a:p>
+              <a:endParaRPr lang="en-US" sz="1800">
+                <a:latin typeface="+mn-lt"/>
+              </a:endParaRPr>
+            </a:p>
+          </p:txBody>
+        </p:sp>
+        <p:sp>
+          <p:nvSpPr>
+            <p:cNvPr id="109" name="Text Box 43">
+              <a:extLst>
+                <a:ext uri="{FF2B5EF4-FFF2-40B4-BE49-F238E27FC236}">
+                  <a16:creationId xmlns:a16="http://schemas.microsoft.com/office/drawing/2014/main" id="{00A62AB7-32EC-4864-94D3-2485223008E1}"/>
+                </a:ext>
+              </a:extLst>
+            </p:cNvPr>
+            <p:cNvSpPr txBox="1">
+              <a:spLocks noChangeArrowheads="1"/>
+            </p:cNvSpPr>
+            <p:nvPr/>
+          </p:nvSpPr>
+          <p:spPr bwMode="auto">
+            <a:xfrm>
+              <a:off x="6332596" y="3720952"/>
+              <a:ext cx="113814" cy="215444"/>
+            </a:xfrm>
+            <a:prstGeom prst="rect">
+              <a:avLst/>
+            </a:prstGeom>
+            <a:solidFill>
+              <a:schemeClr val="bg1"/>
+            </a:solidFill>
+            <a:ln w="9525">
+              <a:noFill/>
+              <a:miter lim="800000"/>
+              <a:headEnd/>
+              <a:tailEnd/>
+            </a:ln>
+            <a:effectLst/>
+          </p:spPr>
+          <p:txBody>
+            <a:bodyPr wrap="none" lIns="0" tIns="0" rIns="0" bIns="0">
+              <a:spAutoFit/>
+            </a:bodyPr>
+            <a:lstStyle/>
+            <a:p>
+              <a:pPr>
+                <a:spcBef>
+                  <a:spcPct val="50000"/>
+                </a:spcBef>
+              </a:pPr>
+              <a:r>
+                <a:rPr lang="en-US" sz="1400" dirty="0">
+                  <a:latin typeface="+mn-lt"/>
+                </a:rPr>
+                <a:t>6</a:t>
+              </a:r>
+            </a:p>
+          </p:txBody>
+        </p:sp>
+        <p:sp>
+          <p:nvSpPr>
+            <p:cNvPr id="110" name="Oval 109">
+              <a:extLst>
+                <a:ext uri="{FF2B5EF4-FFF2-40B4-BE49-F238E27FC236}">
+                  <a16:creationId xmlns:a16="http://schemas.microsoft.com/office/drawing/2014/main" id="{ADCE75E0-8103-8851-CC5E-D23C6DE3F7A7}"/>
+                </a:ext>
+              </a:extLst>
+            </p:cNvPr>
+            <p:cNvSpPr>
+              <a:spLocks noChangeArrowheads="1"/>
+            </p:cNvSpPr>
+            <p:nvPr/>
+          </p:nvSpPr>
+          <p:spPr bwMode="auto">
+            <a:xfrm>
+              <a:off x="6599808" y="1806034"/>
+              <a:ext cx="263849" cy="272858"/>
+            </a:xfrm>
+            <a:prstGeom prst="ellipse">
+              <a:avLst/>
+            </a:prstGeom>
+            <a:solidFill>
+              <a:srgbClr val="CCFFCC"/>
+            </a:solidFill>
+            <a:ln w="9525">
+              <a:solidFill>
+                <a:schemeClr val="tx1"/>
+              </a:solidFill>
+              <a:round/>
+              <a:headEnd/>
+              <a:tailEnd/>
+            </a:ln>
+            <a:effectLst/>
+          </p:spPr>
+          <p:txBody>
+            <a:bodyPr wrap="none" anchor="ctr"/>
+            <a:lstStyle/>
+            <a:p>
+              <a:pPr algn="ctr"/>
+              <a:r>
+                <a:rPr lang="en-US" sz="1400" i="1" dirty="0">
+                  <a:latin typeface="+mn-lt"/>
+                </a:rPr>
+                <a:t>s</a:t>
+              </a:r>
+              <a:r>
+                <a:rPr lang="en-US" sz="1400" dirty="0">
+                  <a:latin typeface="+mn-lt"/>
+                </a:rPr>
+                <a:t>’</a:t>
+              </a:r>
+            </a:p>
+          </p:txBody>
+        </p:sp>
+        <p:sp>
+          <p:nvSpPr>
+            <p:cNvPr id="111" name="Text Box 46">
+              <a:extLst>
+                <a:ext uri="{FF2B5EF4-FFF2-40B4-BE49-F238E27FC236}">
+                  <a16:creationId xmlns:a16="http://schemas.microsoft.com/office/drawing/2014/main" id="{601E1353-215B-A93F-90DB-FE785E168D78}"/>
+                </a:ext>
+              </a:extLst>
+            </p:cNvPr>
+            <p:cNvSpPr txBox="1">
+              <a:spLocks noChangeArrowheads="1"/>
+            </p:cNvSpPr>
+            <p:nvPr/>
+          </p:nvSpPr>
+          <p:spPr bwMode="auto">
+            <a:xfrm>
+              <a:off x="3309034" y="2902662"/>
+              <a:ext cx="113814" cy="215444"/>
+            </a:xfrm>
+            <a:prstGeom prst="rect">
+              <a:avLst/>
+            </a:prstGeom>
+            <a:solidFill>
+              <a:schemeClr val="bg1"/>
+            </a:solidFill>
+            <a:ln w="9525">
+              <a:noFill/>
+              <a:miter lim="800000"/>
+              <a:headEnd/>
+              <a:tailEnd/>
+            </a:ln>
+            <a:effectLst/>
+          </p:spPr>
+          <p:txBody>
+            <a:bodyPr wrap="none" lIns="0" tIns="0" rIns="0" bIns="0">
+              <a:spAutoFit/>
+            </a:bodyPr>
+            <a:lstStyle/>
+            <a:p>
+              <a:pPr>
+                <a:spcBef>
+                  <a:spcPct val="50000"/>
+                </a:spcBef>
+              </a:pPr>
+              <a:r>
+                <a:rPr lang="en-US" sz="1400" dirty="0">
+                  <a:latin typeface="+mn-lt"/>
+                </a:rPr>
+                <a:t>5</a:t>
+              </a:r>
+            </a:p>
+          </p:txBody>
+        </p:sp>
+        <p:sp>
+          <p:nvSpPr>
+            <p:cNvPr id="112" name="Text Box 46">
+              <a:extLst>
+                <a:ext uri="{FF2B5EF4-FFF2-40B4-BE49-F238E27FC236}">
+                  <a16:creationId xmlns:a16="http://schemas.microsoft.com/office/drawing/2014/main" id="{6B9B61B9-76C3-8AE8-8C97-FE420C80D696}"/>
+                </a:ext>
+              </a:extLst>
+            </p:cNvPr>
+            <p:cNvSpPr txBox="1">
+              <a:spLocks noChangeArrowheads="1"/>
+            </p:cNvSpPr>
+            <p:nvPr/>
+          </p:nvSpPr>
+          <p:spPr bwMode="auto">
+            <a:xfrm>
+              <a:off x="7558686" y="2867481"/>
+              <a:ext cx="309380" cy="215444"/>
+            </a:xfrm>
+            <a:prstGeom prst="rect">
+              <a:avLst/>
+            </a:prstGeom>
+            <a:solidFill>
+              <a:schemeClr val="bg1"/>
+            </a:solidFill>
+            <a:ln w="9525">
+              <a:noFill/>
+              <a:miter lim="800000"/>
+              <a:headEnd/>
+              <a:tailEnd/>
+            </a:ln>
+            <a:effectLst/>
+          </p:spPr>
+          <p:txBody>
+            <a:bodyPr wrap="none" lIns="0" tIns="0" rIns="0" bIns="0">
+              <a:spAutoFit/>
+            </a:bodyPr>
+            <a:lstStyle/>
+            <a:p>
+              <a:pPr>
+                <a:spcBef>
+                  <a:spcPct val="50000"/>
+                </a:spcBef>
+              </a:pPr>
+              <a:r>
+                <a:rPr lang="en-US" sz="1400" dirty="0">
+                  <a:latin typeface="+mn-lt"/>
+                </a:rPr>
+                <a:t>5/3</a:t>
+              </a:r>
+            </a:p>
+          </p:txBody>
+        </p:sp>
+        <p:sp>
+          <p:nvSpPr>
+            <p:cNvPr id="114" name="Line 22">
+              <a:extLst>
+                <a:ext uri="{FF2B5EF4-FFF2-40B4-BE49-F238E27FC236}">
+                  <a16:creationId xmlns:a16="http://schemas.microsoft.com/office/drawing/2014/main" id="{D9352FBA-3BDD-B4A6-FCF8-6D20D46A8524}"/>
+                </a:ext>
+              </a:extLst>
+            </p:cNvPr>
+            <p:cNvSpPr>
+              <a:spLocks noChangeShapeType="1"/>
+            </p:cNvSpPr>
+            <p:nvPr/>
+          </p:nvSpPr>
+          <p:spPr bwMode="auto">
+            <a:xfrm flipH="1">
+              <a:off x="6242498" y="2029306"/>
+              <a:ext cx="365467" cy="448220"/>
+            </a:xfrm>
+            <a:prstGeom prst="line">
+              <a:avLst/>
+            </a:prstGeom>
+            <a:noFill/>
+            <a:ln w="9525">
+              <a:solidFill>
+                <a:schemeClr val="tx1"/>
+              </a:solidFill>
+              <a:round/>
+              <a:headEnd/>
+              <a:tailEnd type="triangle" w="med" len="med"/>
+            </a:ln>
+            <a:effectLst/>
+          </p:spPr>
+          <p:txBody>
+            <a:bodyPr/>
+            <a:lstStyle/>
+            <a:p>
+              <a:endParaRPr lang="en-US" sz="1800">
+                <a:latin typeface="+mn-lt"/>
+              </a:endParaRPr>
+            </a:p>
+          </p:txBody>
+        </p:sp>
+        <p:sp>
+          <p:nvSpPr>
+            <p:cNvPr id="116" name="Line 22">
+              <a:extLst>
+                <a:ext uri="{FF2B5EF4-FFF2-40B4-BE49-F238E27FC236}">
+                  <a16:creationId xmlns:a16="http://schemas.microsoft.com/office/drawing/2014/main" id="{5697040E-073D-C766-4471-84706A3804A2}"/>
+                </a:ext>
+              </a:extLst>
+            </p:cNvPr>
+            <p:cNvSpPr>
+              <a:spLocks noChangeShapeType="1"/>
+            </p:cNvSpPr>
+            <p:nvPr/>
+          </p:nvSpPr>
+          <p:spPr bwMode="auto">
+            <a:xfrm>
+              <a:off x="6858624" y="2037703"/>
+              <a:ext cx="386324" cy="448220"/>
+            </a:xfrm>
+            <a:prstGeom prst="line">
+              <a:avLst/>
+            </a:prstGeom>
+            <a:noFill/>
+            <a:ln w="9525">
+              <a:solidFill>
+                <a:schemeClr val="tx1"/>
+              </a:solidFill>
+              <a:round/>
+              <a:headEnd/>
+              <a:tailEnd type="triangle" w="med" len="med"/>
+            </a:ln>
+            <a:effectLst/>
+          </p:spPr>
+          <p:txBody>
+            <a:bodyPr/>
+            <a:lstStyle/>
+            <a:p>
+              <a:endParaRPr lang="en-US" sz="1800">
+                <a:latin typeface="+mn-lt"/>
+              </a:endParaRPr>
+            </a:p>
+          </p:txBody>
+        </p:sp>
+        <p:sp>
+          <p:nvSpPr>
+            <p:cNvPr id="118" name="Line 22">
+              <a:extLst>
+                <a:ext uri="{FF2B5EF4-FFF2-40B4-BE49-F238E27FC236}">
+                  <a16:creationId xmlns:a16="http://schemas.microsoft.com/office/drawing/2014/main" id="{BF198788-910A-6977-42EE-BDD1404845B9}"/>
+                </a:ext>
+              </a:extLst>
+            </p:cNvPr>
+            <p:cNvSpPr>
+              <a:spLocks noChangeShapeType="1"/>
+            </p:cNvSpPr>
+            <p:nvPr/>
+          </p:nvSpPr>
+          <p:spPr bwMode="auto">
+            <a:xfrm>
+              <a:off x="6795727" y="2078893"/>
+              <a:ext cx="502867" cy="2011270"/>
+            </a:xfrm>
+            <a:prstGeom prst="line">
+              <a:avLst/>
+            </a:prstGeom>
+            <a:noFill/>
+            <a:ln w="9525">
+              <a:solidFill>
+                <a:schemeClr val="tx1"/>
+              </a:solidFill>
+              <a:round/>
+              <a:headEnd/>
+              <a:tailEnd type="triangle" w="med" len="med"/>
+            </a:ln>
+            <a:effectLst/>
+          </p:spPr>
+          <p:txBody>
+            <a:bodyPr/>
+            <a:lstStyle/>
+            <a:p>
+              <a:endParaRPr lang="en-US" sz="1800">
+                <a:latin typeface="+mn-lt"/>
+              </a:endParaRPr>
+            </a:p>
+          </p:txBody>
+        </p:sp>
+        <p:sp>
+          <p:nvSpPr>
+            <p:cNvPr id="119" name="Line 22">
+              <a:extLst>
+                <a:ext uri="{FF2B5EF4-FFF2-40B4-BE49-F238E27FC236}">
+                  <a16:creationId xmlns:a16="http://schemas.microsoft.com/office/drawing/2014/main" id="{04EAD856-55AF-553D-5981-85E722079A5D}"/>
+                </a:ext>
+              </a:extLst>
+            </p:cNvPr>
+            <p:cNvSpPr>
+              <a:spLocks noChangeShapeType="1"/>
+            </p:cNvSpPr>
+            <p:nvPr/>
+          </p:nvSpPr>
+          <p:spPr bwMode="auto">
+            <a:xfrm flipH="1" flipV="1">
+              <a:off x="4926714" y="2680396"/>
+              <a:ext cx="388210" cy="612879"/>
+            </a:xfrm>
+            <a:prstGeom prst="line">
+              <a:avLst/>
+            </a:prstGeom>
+            <a:noFill/>
+            <a:ln w="9525">
+              <a:solidFill>
+                <a:schemeClr val="tx1"/>
+              </a:solidFill>
+              <a:round/>
+              <a:headEnd/>
+              <a:tailEnd type="triangle" w="med" len="med"/>
+            </a:ln>
+            <a:effectLst/>
+          </p:spPr>
+          <p:txBody>
+            <a:bodyPr/>
+            <a:lstStyle/>
+            <a:p>
+              <a:endParaRPr lang="en-US" sz="1800">
+                <a:latin typeface="+mn-lt"/>
+              </a:endParaRPr>
+            </a:p>
+          </p:txBody>
+        </p:sp>
+        <p:sp>
+          <p:nvSpPr>
+            <p:cNvPr id="121" name="Line 22">
+              <a:extLst>
+                <a:ext uri="{FF2B5EF4-FFF2-40B4-BE49-F238E27FC236}">
+                  <a16:creationId xmlns:a16="http://schemas.microsoft.com/office/drawing/2014/main" id="{425B18F7-A0EF-BB37-1EBF-7C17DE3DDFA5}"/>
+                </a:ext>
+              </a:extLst>
+            </p:cNvPr>
+            <p:cNvSpPr>
+              <a:spLocks noChangeShapeType="1"/>
+            </p:cNvSpPr>
+            <p:nvPr/>
+          </p:nvSpPr>
+          <p:spPr bwMode="auto">
+            <a:xfrm flipH="1">
+              <a:off x="4982699" y="2578076"/>
+              <a:ext cx="1064234" cy="8303"/>
+            </a:xfrm>
+            <a:prstGeom prst="line">
+              <a:avLst/>
+            </a:prstGeom>
+            <a:noFill/>
+            <a:ln w="9525">
+              <a:solidFill>
+                <a:schemeClr val="tx1"/>
+              </a:solidFill>
+              <a:round/>
+              <a:headEnd/>
+              <a:tailEnd type="triangle" w="med" len="med"/>
+            </a:ln>
+            <a:effectLst/>
+          </p:spPr>
+          <p:txBody>
+            <a:bodyPr/>
+            <a:lstStyle/>
+            <a:p>
+              <a:endParaRPr lang="en-US" sz="1800">
+                <a:latin typeface="+mn-lt"/>
+              </a:endParaRPr>
+            </a:p>
+          </p:txBody>
+        </p:sp>
+        <p:sp>
+          <p:nvSpPr>
+            <p:cNvPr id="122" name="Line 22">
+              <a:extLst>
+                <a:ext uri="{FF2B5EF4-FFF2-40B4-BE49-F238E27FC236}">
+                  <a16:creationId xmlns:a16="http://schemas.microsoft.com/office/drawing/2014/main" id="{92C4B125-6ED5-9330-27CE-7AF3D48D9450}"/>
+                </a:ext>
+              </a:extLst>
+            </p:cNvPr>
+            <p:cNvSpPr>
+              <a:spLocks noChangeShapeType="1"/>
+            </p:cNvSpPr>
+            <p:nvPr/>
+          </p:nvSpPr>
+          <p:spPr bwMode="auto">
+            <a:xfrm flipH="1" flipV="1">
+              <a:off x="4951740" y="2629889"/>
+              <a:ext cx="1558494" cy="703661"/>
+            </a:xfrm>
+            <a:prstGeom prst="line">
+              <a:avLst/>
+            </a:prstGeom>
+            <a:noFill/>
+            <a:ln w="9525">
+              <a:solidFill>
+                <a:schemeClr val="tx1"/>
+              </a:solidFill>
+              <a:round/>
+              <a:headEnd/>
+              <a:tailEnd type="triangle" w="med" len="med"/>
+            </a:ln>
+            <a:effectLst/>
+          </p:spPr>
+          <p:txBody>
+            <a:bodyPr/>
+            <a:lstStyle/>
+            <a:p>
+              <a:endParaRPr lang="en-US" sz="1800">
+                <a:latin typeface="+mn-lt"/>
+              </a:endParaRPr>
+            </a:p>
+          </p:txBody>
+        </p:sp>
+        <p:sp>
+          <p:nvSpPr>
+            <p:cNvPr id="123" name="Text Box 32">
+              <a:extLst>
+                <a:ext uri="{FF2B5EF4-FFF2-40B4-BE49-F238E27FC236}">
+                  <a16:creationId xmlns:a16="http://schemas.microsoft.com/office/drawing/2014/main" id="{93486B3E-C6C8-53AC-9396-B1FB9978A767}"/>
+                </a:ext>
+              </a:extLst>
+            </p:cNvPr>
+            <p:cNvSpPr txBox="1">
+              <a:spLocks noChangeArrowheads="1"/>
+            </p:cNvSpPr>
+            <p:nvPr/>
+          </p:nvSpPr>
+          <p:spPr bwMode="auto">
+            <a:xfrm>
+              <a:off x="4982132" y="2911863"/>
+              <a:ext cx="352070" cy="215444"/>
+            </a:xfrm>
+            <a:prstGeom prst="rect">
+              <a:avLst/>
+            </a:prstGeom>
+            <a:solidFill>
+              <a:schemeClr val="bg1"/>
+            </a:solidFill>
+            <a:ln w="9525">
+              <a:noFill/>
+              <a:miter lim="800000"/>
+              <a:headEnd/>
+              <a:tailEnd/>
+            </a:ln>
+            <a:effectLst/>
+          </p:spPr>
+          <p:txBody>
+            <a:bodyPr wrap="square" lIns="0" tIns="0" rIns="0" bIns="0">
+              <a:spAutoFit/>
+            </a:bodyPr>
+            <a:lstStyle/>
+            <a:p>
+              <a:pPr>
+                <a:spcBef>
+                  <a:spcPct val="50000"/>
+                </a:spcBef>
+              </a:pPr>
+              <a:r>
+                <a:rPr lang="en-US" sz="1400" dirty="0">
+                  <a:latin typeface="+mn-lt"/>
+                </a:rPr>
+                <a:t>2/2</a:t>
+              </a:r>
+            </a:p>
+          </p:txBody>
+        </p:sp>
+        <p:sp>
+          <p:nvSpPr>
+            <p:cNvPr id="124" name="Text Box 36">
+              <a:extLst>
+                <a:ext uri="{FF2B5EF4-FFF2-40B4-BE49-F238E27FC236}">
+                  <a16:creationId xmlns:a16="http://schemas.microsoft.com/office/drawing/2014/main" id="{74FD06AD-7602-6DF5-0B89-1C28F700832D}"/>
+                </a:ext>
+              </a:extLst>
+            </p:cNvPr>
+            <p:cNvSpPr txBox="1">
+              <a:spLocks noChangeArrowheads="1"/>
+            </p:cNvSpPr>
+            <p:nvPr/>
+          </p:nvSpPr>
+          <p:spPr bwMode="auto">
+            <a:xfrm>
+              <a:off x="5285352" y="2713226"/>
+              <a:ext cx="309380" cy="215444"/>
+            </a:xfrm>
+            <a:prstGeom prst="rect">
+              <a:avLst/>
+            </a:prstGeom>
+            <a:solidFill>
+              <a:schemeClr val="bg1"/>
+            </a:solidFill>
+            <a:ln w="9525">
+              <a:noFill/>
+              <a:miter lim="800000"/>
+              <a:headEnd/>
+              <a:tailEnd/>
+            </a:ln>
+            <a:effectLst/>
+          </p:spPr>
+          <p:txBody>
+            <a:bodyPr wrap="none" lIns="0" tIns="0" rIns="0" bIns="0">
+              <a:spAutoFit/>
+            </a:bodyPr>
+            <a:lstStyle/>
+            <a:p>
+              <a:pPr>
+                <a:spcBef>
+                  <a:spcPct val="50000"/>
+                </a:spcBef>
+              </a:pPr>
+              <a:r>
+                <a:rPr lang="en-US" sz="1400" dirty="0">
+                  <a:latin typeface="+mn-lt"/>
+                </a:rPr>
+                <a:t>1/1</a:t>
+              </a:r>
+            </a:p>
+          </p:txBody>
+        </p:sp>
+        <p:sp>
+          <p:nvSpPr>
+            <p:cNvPr id="125" name="Text Box 36">
+              <a:extLst>
+                <a:ext uri="{FF2B5EF4-FFF2-40B4-BE49-F238E27FC236}">
+                  <a16:creationId xmlns:a16="http://schemas.microsoft.com/office/drawing/2014/main" id="{49CADF73-99C2-6A95-B24B-9E59D7F97BB8}"/>
+                </a:ext>
+              </a:extLst>
+            </p:cNvPr>
+            <p:cNvSpPr txBox="1">
+              <a:spLocks noChangeArrowheads="1"/>
+            </p:cNvSpPr>
+            <p:nvPr/>
+          </p:nvSpPr>
+          <p:spPr bwMode="auto">
+            <a:xfrm>
+              <a:off x="5453713" y="2460413"/>
+              <a:ext cx="309380" cy="215444"/>
+            </a:xfrm>
+            <a:prstGeom prst="rect">
+              <a:avLst/>
+            </a:prstGeom>
+            <a:solidFill>
+              <a:schemeClr val="bg1"/>
+            </a:solidFill>
+            <a:ln w="9525">
+              <a:noFill/>
+              <a:miter lim="800000"/>
+              <a:headEnd/>
+              <a:tailEnd/>
+            </a:ln>
+            <a:effectLst/>
+          </p:spPr>
+          <p:txBody>
+            <a:bodyPr wrap="none" lIns="0" tIns="0" rIns="0" bIns="0">
+              <a:spAutoFit/>
+            </a:bodyPr>
+            <a:lstStyle/>
+            <a:p>
+              <a:pPr>
+                <a:spcBef>
+                  <a:spcPct val="50000"/>
+                </a:spcBef>
+              </a:pPr>
+              <a:r>
+                <a:rPr lang="en-US" sz="1400" dirty="0">
+                  <a:latin typeface="+mn-lt"/>
+                </a:rPr>
+                <a:t>3/3</a:t>
+              </a:r>
+            </a:p>
+          </p:txBody>
+        </p:sp>
+        <p:sp>
+          <p:nvSpPr>
+            <p:cNvPr id="126" name="Text Box 46">
+              <a:extLst>
+                <a:ext uri="{FF2B5EF4-FFF2-40B4-BE49-F238E27FC236}">
+                  <a16:creationId xmlns:a16="http://schemas.microsoft.com/office/drawing/2014/main" id="{0EE7DD94-A652-62FD-EEEB-2CDE75C0B3B3}"/>
+                </a:ext>
+              </a:extLst>
+            </p:cNvPr>
+            <p:cNvSpPr txBox="1">
+              <a:spLocks noChangeArrowheads="1"/>
+            </p:cNvSpPr>
+            <p:nvPr/>
+          </p:nvSpPr>
+          <p:spPr bwMode="auto">
+            <a:xfrm>
+              <a:off x="6967923" y="3281819"/>
+              <a:ext cx="309380" cy="215444"/>
+            </a:xfrm>
+            <a:prstGeom prst="rect">
+              <a:avLst/>
+            </a:prstGeom>
+            <a:solidFill>
+              <a:schemeClr val="bg1"/>
+            </a:solidFill>
+            <a:ln w="9525">
+              <a:noFill/>
+              <a:miter lim="800000"/>
+              <a:headEnd/>
+              <a:tailEnd/>
+            </a:ln>
+            <a:effectLst/>
+          </p:spPr>
+          <p:txBody>
+            <a:bodyPr wrap="none" lIns="0" tIns="0" rIns="0" bIns="0">
+              <a:spAutoFit/>
+            </a:bodyPr>
+            <a:lstStyle/>
+            <a:p>
+              <a:pPr>
+                <a:spcBef>
+                  <a:spcPct val="50000"/>
+                </a:spcBef>
+              </a:pPr>
+              <a:r>
+                <a:rPr lang="en-US" sz="1400" dirty="0">
+                  <a:latin typeface="+mn-lt"/>
+                </a:rPr>
+                <a:t>1/1</a:t>
+              </a:r>
+            </a:p>
+          </p:txBody>
+        </p:sp>
+        <p:sp>
+          <p:nvSpPr>
+            <p:cNvPr id="127" name="Text Box 46">
+              <a:extLst>
+                <a:ext uri="{FF2B5EF4-FFF2-40B4-BE49-F238E27FC236}">
+                  <a16:creationId xmlns:a16="http://schemas.microsoft.com/office/drawing/2014/main" id="{FFF0E751-547C-2522-4733-3708F63D4DC9}"/>
+                </a:ext>
+              </a:extLst>
+            </p:cNvPr>
+            <p:cNvSpPr txBox="1">
+              <a:spLocks noChangeArrowheads="1"/>
+            </p:cNvSpPr>
+            <p:nvPr/>
+          </p:nvSpPr>
+          <p:spPr bwMode="auto">
+            <a:xfrm>
+              <a:off x="6936806" y="2108910"/>
+              <a:ext cx="309380" cy="215444"/>
+            </a:xfrm>
+            <a:prstGeom prst="rect">
+              <a:avLst/>
+            </a:prstGeom>
+            <a:solidFill>
+              <a:schemeClr val="bg1"/>
+            </a:solidFill>
+            <a:ln w="9525">
+              <a:noFill/>
+              <a:miter lim="800000"/>
+              <a:headEnd/>
+              <a:tailEnd/>
+            </a:ln>
+            <a:effectLst/>
+          </p:spPr>
+          <p:txBody>
+            <a:bodyPr wrap="none" lIns="0" tIns="0" rIns="0" bIns="0">
+              <a:spAutoFit/>
+            </a:bodyPr>
+            <a:lstStyle/>
+            <a:p>
+              <a:pPr>
+                <a:spcBef>
+                  <a:spcPct val="50000"/>
+                </a:spcBef>
+              </a:pPr>
+              <a:r>
+                <a:rPr lang="en-US" sz="1400" dirty="0">
+                  <a:latin typeface="+mn-lt"/>
+                </a:rPr>
+                <a:t>3/3</a:t>
+              </a:r>
+            </a:p>
+          </p:txBody>
+        </p:sp>
+        <p:sp>
+          <p:nvSpPr>
+            <p:cNvPr id="128" name="Text Box 46">
+              <a:extLst>
+                <a:ext uri="{FF2B5EF4-FFF2-40B4-BE49-F238E27FC236}">
+                  <a16:creationId xmlns:a16="http://schemas.microsoft.com/office/drawing/2014/main" id="{F4BCBCED-ACBA-DCD5-90D1-3CFE98431416}"/>
+                </a:ext>
+              </a:extLst>
+            </p:cNvPr>
+            <p:cNvSpPr txBox="1">
+              <a:spLocks noChangeArrowheads="1"/>
+            </p:cNvSpPr>
+            <p:nvPr/>
+          </p:nvSpPr>
+          <p:spPr bwMode="auto">
+            <a:xfrm>
+              <a:off x="6318623" y="2128230"/>
+              <a:ext cx="309380" cy="215444"/>
+            </a:xfrm>
+            <a:prstGeom prst="rect">
+              <a:avLst/>
+            </a:prstGeom>
+            <a:solidFill>
+              <a:schemeClr val="bg1"/>
+            </a:solidFill>
+            <a:ln w="9525">
+              <a:noFill/>
+              <a:miter lim="800000"/>
+              <a:headEnd/>
+              <a:tailEnd/>
+            </a:ln>
+            <a:effectLst/>
+          </p:spPr>
+          <p:txBody>
+            <a:bodyPr wrap="none" lIns="0" tIns="0" rIns="0" bIns="0">
+              <a:spAutoFit/>
+            </a:bodyPr>
+            <a:lstStyle/>
+            <a:p>
+              <a:pPr>
+                <a:spcBef>
+                  <a:spcPct val="50000"/>
+                </a:spcBef>
+              </a:pPr>
+              <a:r>
+                <a:rPr lang="en-US" sz="1400" dirty="0">
+                  <a:latin typeface="+mn-lt"/>
+                </a:rPr>
+                <a:t>2/2</a:t>
+              </a:r>
+            </a:p>
+          </p:txBody>
+        </p:sp>
+        <p:sp>
+          <p:nvSpPr>
+            <p:cNvPr id="113" name="Oval 112">
+              <a:extLst>
+                <a:ext uri="{FF2B5EF4-FFF2-40B4-BE49-F238E27FC236}">
+                  <a16:creationId xmlns:a16="http://schemas.microsoft.com/office/drawing/2014/main" id="{ACB860BD-ECF6-E6DF-5614-21C032B96ECF}"/>
+                </a:ext>
+              </a:extLst>
+            </p:cNvPr>
+            <p:cNvSpPr>
+              <a:spLocks noChangeArrowheads="1"/>
+            </p:cNvSpPr>
+            <p:nvPr/>
+          </p:nvSpPr>
+          <p:spPr bwMode="auto">
+            <a:xfrm>
+              <a:off x="4710459" y="2454389"/>
+              <a:ext cx="263849" cy="272858"/>
+            </a:xfrm>
+            <a:prstGeom prst="ellipse">
+              <a:avLst/>
+            </a:prstGeom>
+            <a:solidFill>
+              <a:srgbClr val="CCFFCC"/>
+            </a:solidFill>
+            <a:ln w="9525">
+              <a:solidFill>
+                <a:schemeClr val="tx1"/>
+              </a:solidFill>
+              <a:round/>
+              <a:headEnd/>
+              <a:tailEnd/>
+            </a:ln>
+            <a:effectLst/>
+          </p:spPr>
+          <p:txBody>
+            <a:bodyPr wrap="none" anchor="ctr"/>
+            <a:lstStyle/>
+            <a:p>
+              <a:pPr algn="ctr"/>
+              <a:r>
+                <a:rPr lang="en-US" sz="1400" i="1" dirty="0">
+                  <a:latin typeface="+mn-lt"/>
+                </a:rPr>
+                <a:t>t</a:t>
+              </a:r>
+              <a:r>
+                <a:rPr lang="en-US" sz="1400" dirty="0">
+                  <a:latin typeface="+mn-lt"/>
+                </a:rPr>
+                <a:t>’</a:t>
+              </a:r>
+            </a:p>
+          </p:txBody>
+        </p:sp>
+        <p:sp>
+          <p:nvSpPr>
+            <p:cNvPr id="131" name="Arc 130">
+              <a:extLst>
+                <a:ext uri="{FF2B5EF4-FFF2-40B4-BE49-F238E27FC236}">
+                  <a16:creationId xmlns:a16="http://schemas.microsoft.com/office/drawing/2014/main" id="{D2350FE7-3A67-1483-668A-B933C06E211C}"/>
+                </a:ext>
+              </a:extLst>
+            </p:cNvPr>
+            <p:cNvSpPr/>
+            <p:nvPr/>
+          </p:nvSpPr>
+          <p:spPr bwMode="auto">
+            <a:xfrm>
+              <a:off x="5080273" y="3130773"/>
+              <a:ext cx="3312295" cy="1480953"/>
+            </a:xfrm>
+            <a:prstGeom prst="arc">
+              <a:avLst>
+                <a:gd name="adj1" fmla="val 20565717"/>
+                <a:gd name="adj2" fmla="val 11623094"/>
+              </a:avLst>
+            </a:prstGeom>
+            <a:noFill/>
+            <a:ln w="12700" cap="flat" cmpd="sng" algn="ctr">
+              <a:solidFill>
+                <a:schemeClr val="tx1"/>
+              </a:solidFill>
+              <a:prstDash val="solid"/>
+              <a:round/>
+              <a:headEnd type="none" w="sm" len="sm"/>
+              <a:tailEnd type="triangle" w="med" len="med"/>
+            </a:ln>
+            <a:effectLst/>
+          </p:spPr>
+          <p:txBody>
+            <a:bodyPr vert="horz" wrap="square" lIns="91440" tIns="45720" rIns="91440" bIns="45720" numCol="1" rtlCol="0" anchor="t" anchorCtr="0" compatLnSpc="1">
+              <a:prstTxWarp prst="textNoShape">
+                <a:avLst/>
+              </a:prstTxWarp>
+            </a:bodyPr>
+            <a:lstStyle/>
+            <a:p>
+              <a:pPr marL="0" marR="0" indent="0" algn="l" defTabSz="914400" rtl="0" eaLnBrk="0" fontAlgn="base" latinLnBrk="0" hangingPunct="0">
+                <a:lnSpc>
+                  <a:spcPct val="100000"/>
+                </a:lnSpc>
+                <a:spcBef>
+                  <a:spcPct val="0"/>
+                </a:spcBef>
+                <a:spcAft>
+                  <a:spcPct val="0"/>
+                </a:spcAft>
+                <a:buClrTx/>
+                <a:buSzTx/>
+                <a:buFontTx/>
+                <a:buNone/>
+                <a:tabLst/>
+              </a:pPr>
+              <a:endParaRPr kumimoji="0" lang="en-US" sz="1600" b="0" i="0" u="none" strike="noStrike" cap="none" normalizeH="0" baseline="0">
+                <a:ln>
+                  <a:noFill/>
+                </a:ln>
+                <a:solidFill>
+                  <a:schemeClr val="tx2"/>
+                </a:solidFill>
+                <a:effectLst/>
+                <a:latin typeface="Book Antiqua" pitchFamily="18" charset="0"/>
+              </a:endParaRPr>
+            </a:p>
+          </p:txBody>
+        </p:sp>
+        <p:sp>
+          <p:nvSpPr>
+            <p:cNvPr id="133" name="Text Box 34">
+              <a:extLst>
+                <a:ext uri="{FF2B5EF4-FFF2-40B4-BE49-F238E27FC236}">
+                  <a16:creationId xmlns:a16="http://schemas.microsoft.com/office/drawing/2014/main" id="{5D540A83-5819-3D7A-67A2-052714E0EEE6}"/>
+                </a:ext>
+              </a:extLst>
+            </p:cNvPr>
+            <p:cNvSpPr txBox="1">
+              <a:spLocks noChangeArrowheads="1"/>
+            </p:cNvSpPr>
+            <p:nvPr/>
+          </p:nvSpPr>
+          <p:spPr bwMode="auto">
+            <a:xfrm>
+              <a:off x="6638975" y="4509422"/>
+              <a:ext cx="314705" cy="215444"/>
+            </a:xfrm>
+            <a:prstGeom prst="rect">
+              <a:avLst/>
+            </a:prstGeom>
+            <a:solidFill>
+              <a:schemeClr val="bg1"/>
+            </a:solidFill>
+            <a:ln w="9525">
+              <a:noFill/>
+              <a:miter lim="800000"/>
+              <a:headEnd/>
+              <a:tailEnd/>
+            </a:ln>
+            <a:effectLst/>
+          </p:spPr>
+          <p:txBody>
+            <a:bodyPr wrap="square" lIns="0" tIns="0" rIns="0" bIns="0">
+              <a:spAutoFit/>
+            </a:bodyPr>
+            <a:lstStyle/>
+            <a:p>
+              <a:pPr algn="ctr">
+                <a:spcBef>
+                  <a:spcPct val="50000"/>
+                </a:spcBef>
+              </a:pPr>
+              <a:r>
+                <a:rPr lang="en-US" sz="1400" dirty="0">
+                  <a:latin typeface="+mn-lt"/>
+                </a:rPr>
+                <a:t>6/4</a:t>
+              </a:r>
+            </a:p>
+          </p:txBody>
+        </p:sp>
+      </p:grpSp>
+    </p:spTree>
+    <p:extLst>
+      <p:ext uri="{BB962C8B-B14F-4D97-AF65-F5344CB8AC3E}">
+        <p14:creationId xmlns:p14="http://schemas.microsoft.com/office/powerpoint/2010/main" val="1375233196"/>
+      </p:ext>
+    </p:extLst>
+  </p:cSld>
+  <p:clrMapOvr>
+    <a:masterClrMapping/>
+  </p:clrMapOvr>
+</p:sld>
+</file>
+
 <file path=ppt/slides/slide2.xml><?xml version="1.0" encoding="utf-8"?>
 <p:sld xmlns:a="http://schemas.openxmlformats.org/drawingml/2006/main" xmlns:r="http://schemas.openxmlformats.org/officeDocument/2006/relationships" xmlns:p="http://schemas.openxmlformats.org/presentationml/2006/main" showMasterPhAnim="0">
   <p:cSld>

</xml_diff>